<commit_message>
Added project submission for team 14252930
slides as per guidlines
</commit_message>
<xml_diff>
--- a/slide/Slides.pptx
+++ b/slide/Slides.pptx
@@ -12,7 +12,7 @@
   </p:handoutMasterIdLst>
   <p:sldIdLst>
     <p:sldId id="257" r:id="rId2"/>
-    <p:sldId id="269" r:id="rId3"/>
+    <p:sldId id="258" r:id="rId3"/>
     <p:sldId id="259" r:id="rId4"/>
     <p:sldId id="260" r:id="rId5"/>
     <p:sldId id="262" r:id="rId6"/>
@@ -209,7 +209,7 @@
           <a:p>
             <a:fld id="{82218430-A839-4B9A-B57C-D26FE10EECE2}" type="datetimeFigureOut">
               <a:rPr lang="en-US" smtClean="0"/>
-              <a:t>3/13/2025</a:t>
+              <a:t>3/10/2025</a:t>
             </a:fld>
             <a:endParaRPr lang="en-US" dirty="0"/>
           </a:p>
@@ -379,7 +379,7 @@
           <a:p>
             <a:fld id="{F150F4B7-A3B8-44DB-B027-65EB161F2BE9}" type="datetimeFigureOut">
               <a:rPr lang="en-US" smtClean="0"/>
-              <a:t>3/13/2025</a:t>
+              <a:t>3/10/2025</a:t>
             </a:fld>
             <a:endParaRPr lang="en-US" dirty="0"/>
           </a:p>
@@ -856,7 +856,7 @@
     </p:spTree>
     <p:extLst>
       <p:ext uri="{BB962C8B-B14F-4D97-AF65-F5344CB8AC3E}">
-        <p14:creationId xmlns:p14="http://schemas.microsoft.com/office/powerpoint/2010/main" val="2629179974"/>
+        <p14:creationId xmlns:p14="http://schemas.microsoft.com/office/powerpoint/2010/main" val="2509390393"/>
       </p:ext>
     </p:extLst>
   </p:cSld>
@@ -997,7 +997,7 @@
           <a:p>
             <a:fld id="{22E47C2B-2831-48BF-A706-A2B73A72B1C1}" type="datetime1">
               <a:rPr lang="en-US" smtClean="0"/>
-              <a:t>3/13/2025</a:t>
+              <a:t>3/10/2025</a:t>
             </a:fld>
             <a:endParaRPr lang="en-US" dirty="0"/>
           </a:p>
@@ -1171,7 +1171,7 @@
           <a:p>
             <a:fld id="{B0D73870-BCD5-4D0C-ABB6-CC145225DCC6}" type="datetime1">
               <a:rPr lang="en-US" smtClean="0"/>
-              <a:t>3/13/2025</a:t>
+              <a:t>3/10/2025</a:t>
             </a:fld>
             <a:endParaRPr lang="en-US" dirty="0"/>
           </a:p>
@@ -1355,7 +1355,7 @@
           <a:p>
             <a:fld id="{E49B4E91-36C1-4015-AA68-F2162F5803EC}" type="datetime1">
               <a:rPr lang="en-US" smtClean="0"/>
-              <a:t>3/13/2025</a:t>
+              <a:t>3/10/2025</a:t>
             </a:fld>
             <a:endParaRPr lang="en-US" dirty="0"/>
           </a:p>
@@ -1529,7 +1529,7 @@
           <a:p>
             <a:fld id="{D008DA4E-F4CB-4E76-930D-10298A40F2E3}" type="datetime1">
               <a:rPr lang="en-US" smtClean="0"/>
-              <a:t>3/13/2025</a:t>
+              <a:t>3/10/2025</a:t>
             </a:fld>
             <a:endParaRPr lang="en-US" dirty="0"/>
           </a:p>
@@ -1779,7 +1779,7 @@
           <a:p>
             <a:fld id="{F5D9BD84-00F1-4637-ACF0-7341CE95C4E9}" type="datetime1">
               <a:rPr lang="en-US" smtClean="0"/>
-              <a:t>3/13/2025</a:t>
+              <a:t>3/10/2025</a:t>
             </a:fld>
             <a:endParaRPr lang="en-US" dirty="0"/>
           </a:p>
@@ -2015,7 +2015,7 @@
           <a:p>
             <a:fld id="{5E2A4199-BA16-42DB-8DDB-A17C493E2F22}" type="datetime1">
               <a:rPr lang="en-US" smtClean="0"/>
-              <a:t>3/13/2025</a:t>
+              <a:t>3/10/2025</a:t>
             </a:fld>
             <a:endParaRPr lang="en-US" dirty="0"/>
           </a:p>
@@ -2386,7 +2386,7 @@
           <a:p>
             <a:fld id="{C74D4E61-DA9A-41FA-9E86-EFA1A0470AC2}" type="datetime1">
               <a:rPr lang="en-US" smtClean="0"/>
-              <a:t>3/13/2025</a:t>
+              <a:t>3/10/2025</a:t>
             </a:fld>
             <a:endParaRPr lang="en-US" dirty="0"/>
           </a:p>
@@ -2508,7 +2508,7 @@
           <a:p>
             <a:fld id="{BAD495CD-1B89-49F3-9509-05CAAC3A7C72}" type="datetime1">
               <a:rPr lang="en-US" smtClean="0"/>
-              <a:t>3/13/2025</a:t>
+              <a:t>3/10/2025</a:t>
             </a:fld>
             <a:endParaRPr lang="en-US" dirty="0"/>
           </a:p>
@@ -2607,7 +2607,7 @@
           <a:p>
             <a:fld id="{B39CA6A2-C3C8-4608-BC1D-B3358E2DB28C}" type="datetime1">
               <a:rPr lang="en-US" smtClean="0"/>
-              <a:t>3/13/2025</a:t>
+              <a:t>3/10/2025</a:t>
             </a:fld>
             <a:endParaRPr lang="en-US" dirty="0"/>
           </a:p>
@@ -2888,7 +2888,7 @@
           <a:p>
             <a:fld id="{772F69E8-61D2-411B-8712-B0248011E4EB}" type="datetime1">
               <a:rPr lang="en-US" smtClean="0"/>
-              <a:t>3/13/2025</a:t>
+              <a:t>3/10/2025</a:t>
             </a:fld>
             <a:endParaRPr lang="en-US" dirty="0"/>
           </a:p>
@@ -3145,7 +3145,7 @@
           <a:p>
             <a:fld id="{9A2C7C78-D52B-404E-BE9A-5424C42F3A52}" type="datetime1">
               <a:rPr lang="en-US" smtClean="0"/>
-              <a:t>3/13/2025</a:t>
+              <a:t>3/10/2025</a:t>
             </a:fld>
             <a:endParaRPr lang="en-US" dirty="0"/>
           </a:p>
@@ -3362,7 +3362,7 @@
           <a:p>
             <a:fld id="{F0C51F79-E061-4E94-BD9C-2B683078B6BD}" type="datetime1">
               <a:rPr lang="en-US" smtClean="0"/>
-              <a:t>3/13/2025</a:t>
+              <a:t>3/10/2025</a:t>
             </a:fld>
             <a:endParaRPr lang="en-US" dirty="0"/>
           </a:p>
@@ -3939,104 +3939,89 @@
           </a:p>
         </p:txBody>
       </p:sp>
-      <p:grpSp>
-        <p:nvGrpSpPr>
-          <p:cNvPr id="7" name="Group 6"/>
-          <p:cNvGrpSpPr/>
+      <p:sp>
+        <p:nvSpPr>
+          <p:cNvPr id="5" name="Rectangle 4"/>
+          <p:cNvSpPr/>
           <p:nvPr/>
-        </p:nvGrpSpPr>
-        <p:grpSpPr>
+        </p:nvSpPr>
+        <p:spPr>
           <a:xfrm>
-            <a:off x="5750648" y="4343002"/>
-            <a:ext cx="6268063" cy="878290"/>
-            <a:chOff x="5750648" y="4343002"/>
-            <a:chExt cx="6268063" cy="878290"/>
+            <a:off x="5750648" y="4821182"/>
+            <a:ext cx="6268063" cy="400110"/>
           </a:xfrm>
-        </p:grpSpPr>
-        <p:sp>
-          <p:nvSpPr>
-            <p:cNvPr id="5" name="Rectangle 4"/>
-            <p:cNvSpPr/>
-            <p:nvPr/>
-          </p:nvSpPr>
-          <p:spPr>
-            <a:xfrm>
-              <a:off x="5750648" y="4821182"/>
-              <a:ext cx="6268063" cy="400110"/>
-            </a:xfrm>
-            <a:prstGeom prst="rect">
-              <a:avLst/>
-            </a:prstGeom>
-            <a:noFill/>
-          </p:spPr>
-          <p:txBody>
-            <a:bodyPr wrap="none" lIns="91440" tIns="45720" rIns="91440" bIns="45720">
-              <a:spAutoFit/>
-            </a:bodyPr>
-            <a:lstStyle/>
-            <a:p>
-              <a:pPr algn="ctr"/>
-              <a:r>
-                <a:rPr lang="en-US" sz="2000" dirty="0" smtClean="0">
-                  <a:ln w="0"/>
-                  <a:latin typeface="Arial" panose="020B0604020202020204" pitchFamily="34" charset="0"/>
-                  <a:cs typeface="Arial" panose="020B0604020202020204" pitchFamily="34" charset="0"/>
-                </a:rPr>
-                <a:t>Department of Electronics and Computer Engineering</a:t>
-              </a:r>
-              <a:endParaRPr lang="en-US" sz="2000" b="0" cap="none" spc="0" dirty="0">
-                <a:ln w="0"/>
-                <a:solidFill>
-                  <a:schemeClr val="tx1"/>
-                </a:solidFill>
+          <a:prstGeom prst="rect">
+            <a:avLst/>
+          </a:prstGeom>
+          <a:noFill/>
+        </p:spPr>
+        <p:txBody>
+          <a:bodyPr wrap="none" lIns="91440" tIns="45720" rIns="91440" bIns="45720">
+            <a:spAutoFit/>
+          </a:bodyPr>
+          <a:lstStyle/>
+          <a:p>
+            <a:pPr algn="ctr"/>
+            <a:r>
+              <a:rPr lang="en-US" sz="2000" dirty="0" smtClean="0">
+                <a:ln w="0"/>
                 <a:latin typeface="Arial" panose="020B0604020202020204" pitchFamily="34" charset="0"/>
                 <a:cs typeface="Arial" panose="020B0604020202020204" pitchFamily="34" charset="0"/>
-              </a:endParaRPr>
-            </a:p>
-          </p:txBody>
-        </p:sp>
-        <p:sp>
-          <p:nvSpPr>
-            <p:cNvPr id="6" name="Rectangle 5"/>
-            <p:cNvSpPr/>
-            <p:nvPr/>
-          </p:nvSpPr>
-          <p:spPr>
-            <a:xfrm>
-              <a:off x="6301184" y="4343002"/>
-              <a:ext cx="5166992" cy="400110"/>
-            </a:xfrm>
-            <a:prstGeom prst="rect">
-              <a:avLst/>
-            </a:prstGeom>
-          </p:spPr>
-          <p:txBody>
-            <a:bodyPr wrap="none">
-              <a:spAutoFit/>
-            </a:bodyPr>
-            <a:lstStyle/>
-            <a:p>
-              <a:pPr algn="ctr"/>
-              <a:r>
-                <a:rPr lang="en-US" sz="2000" dirty="0" smtClean="0">
-                  <a:ln w="0"/>
-                  <a:latin typeface="Arial" panose="020B0604020202020204" pitchFamily="34" charset="0"/>
-                  <a:cs typeface="Arial" panose="020B0604020202020204" pitchFamily="34" charset="0"/>
-                </a:rPr>
-                <a:t>Institute of Engineering, Thapathali Campus</a:t>
-              </a:r>
-              <a:endParaRPr lang="en-US" sz="2000" b="0" cap="none" spc="0" dirty="0">
-                <a:ln w="0"/>
-                <a:solidFill>
-                  <a:schemeClr val="tx1"/>
-                </a:solidFill>
+              </a:rPr>
+              <a:t>Department of Electronics and Computer Engineering</a:t>
+            </a:r>
+            <a:endParaRPr lang="en-US" sz="2000" b="0" cap="none" spc="0" dirty="0">
+              <a:ln w="0"/>
+              <a:solidFill>
+                <a:schemeClr val="tx1"/>
+              </a:solidFill>
+              <a:latin typeface="Arial" panose="020B0604020202020204" pitchFamily="34" charset="0"/>
+              <a:cs typeface="Arial" panose="020B0604020202020204" pitchFamily="34" charset="0"/>
+            </a:endParaRPr>
+          </a:p>
+        </p:txBody>
+      </p:sp>
+      <p:sp>
+        <p:nvSpPr>
+          <p:cNvPr id="6" name="Rectangle 5"/>
+          <p:cNvSpPr/>
+          <p:nvPr/>
+        </p:nvSpPr>
+        <p:spPr>
+          <a:xfrm>
+            <a:off x="6301184" y="4343002"/>
+            <a:ext cx="5166992" cy="400110"/>
+          </a:xfrm>
+          <a:prstGeom prst="rect">
+            <a:avLst/>
+          </a:prstGeom>
+        </p:spPr>
+        <p:txBody>
+          <a:bodyPr wrap="none">
+            <a:spAutoFit/>
+          </a:bodyPr>
+          <a:lstStyle/>
+          <a:p>
+            <a:pPr algn="ctr"/>
+            <a:r>
+              <a:rPr lang="en-US" sz="2000" dirty="0" smtClean="0">
+                <a:ln w="0"/>
                 <a:latin typeface="Arial" panose="020B0604020202020204" pitchFamily="34" charset="0"/>
                 <a:cs typeface="Arial" panose="020B0604020202020204" pitchFamily="34" charset="0"/>
-              </a:endParaRPr>
-            </a:p>
-          </p:txBody>
-        </p:sp>
-      </p:grpSp>
+              </a:rPr>
+              <a:t>Institute of Engineering, Thapathali Campus</a:t>
+            </a:r>
+            <a:endParaRPr lang="en-US" sz="2000" b="0" cap="none" spc="0" dirty="0">
+              <a:ln w="0"/>
+              <a:solidFill>
+                <a:schemeClr val="tx1"/>
+              </a:solidFill>
+              <a:latin typeface="Arial" panose="020B0604020202020204" pitchFamily="34" charset="0"/>
+              <a:cs typeface="Arial" panose="020B0604020202020204" pitchFamily="34" charset="0"/>
+            </a:endParaRPr>
+          </a:p>
+        </p:txBody>
+      </p:sp>
       <p:sp>
         <p:nvSpPr>
           <p:cNvPr id="8" name="Rectangle 7"/>
@@ -4089,440 +4074,12 @@
   <p:clrMapOvr>
     <a:masterClrMapping/>
   </p:clrMapOvr>
-  <mc:AlternateContent xmlns:mc="http://schemas.openxmlformats.org/markup-compatibility/2006" xmlns:p15="http://schemas.microsoft.com/office/powerpoint/2012/main">
-    <mc:Choice Requires="p15">
-      <p:transition xmlns:p14="http://schemas.microsoft.com/office/powerpoint/2010/main" spd="slow" p14:dur="6000">
-        <p15:prstTrans prst="curtains"/>
-      </p:transition>
-    </mc:Choice>
-    <mc:Fallback xmlns="">
-      <p:transition spd="slow">
-        <p:fade/>
-      </p:transition>
-    </mc:Fallback>
-  </mc:AlternateContent>
   <p:timing>
     <p:tnLst>
       <p:par>
-        <p:cTn id="1" dur="indefinite" restart="never" nodeType="tmRoot">
-          <p:childTnLst>
-            <p:seq concurrent="1" nextAc="seek">
-              <p:cTn id="2" dur="indefinite" nodeType="mainSeq">
-                <p:childTnLst>
-                  <p:par>
-                    <p:cTn id="3" fill="hold">
-                      <p:stCondLst>
-                        <p:cond delay="indefinite"/>
-                      </p:stCondLst>
-                      <p:childTnLst>
-                        <p:par>
-                          <p:cTn id="4" fill="hold">
-                            <p:stCondLst>
-                              <p:cond delay="0"/>
-                            </p:stCondLst>
-                            <p:childTnLst>
-                              <p:par>
-                                <p:cTn id="5" presetID="1" presetClass="entr" presetSubtype="0" fill="hold" grpId="0" nodeType="clickEffect">
-                                  <p:stCondLst>
-                                    <p:cond delay="0"/>
-                                  </p:stCondLst>
-                                  <p:childTnLst>
-                                    <p:set>
-                                      <p:cBhvr>
-                                        <p:cTn id="6" dur="1" fill="hold">
-                                          <p:stCondLst>
-                                            <p:cond delay="0"/>
-                                          </p:stCondLst>
-                                        </p:cTn>
-                                        <p:tgtEl>
-                                          <p:spTgt spid="8"/>
-                                        </p:tgtEl>
-                                        <p:attrNameLst>
-                                          <p:attrName>style.visibility</p:attrName>
-                                        </p:attrNameLst>
-                                      </p:cBhvr>
-                                      <p:to>
-                                        <p:strVal val="visible"/>
-                                      </p:to>
-                                    </p:set>
-                                  </p:childTnLst>
-                                </p:cTn>
-                              </p:par>
-                            </p:childTnLst>
-                          </p:cTn>
-                        </p:par>
-                      </p:childTnLst>
-                    </p:cTn>
-                  </p:par>
-                  <p:par>
-                    <p:cTn id="7" fill="hold">
-                      <p:stCondLst>
-                        <p:cond delay="indefinite"/>
-                      </p:stCondLst>
-                      <p:childTnLst>
-                        <p:par>
-                          <p:cTn id="8" fill="hold">
-                            <p:stCondLst>
-                              <p:cond delay="0"/>
-                            </p:stCondLst>
-                            <p:childTnLst>
-                              <p:par>
-                                <p:cTn id="9" presetID="12" presetClass="entr" presetSubtype="4" fill="hold" grpId="0" nodeType="clickEffect">
-                                  <p:stCondLst>
-                                    <p:cond delay="0"/>
-                                  </p:stCondLst>
-                                  <p:childTnLst>
-                                    <p:set>
-                                      <p:cBhvr>
-                                        <p:cTn id="10" dur="1" fill="hold">
-                                          <p:stCondLst>
-                                            <p:cond delay="0"/>
-                                          </p:stCondLst>
-                                        </p:cTn>
-                                        <p:tgtEl>
-                                          <p:spTgt spid="2">
-                                            <p:txEl>
-                                              <p:pRg st="0" end="0"/>
-                                            </p:txEl>
-                                          </p:spTgt>
-                                        </p:tgtEl>
-                                        <p:attrNameLst>
-                                          <p:attrName>style.visibility</p:attrName>
-                                        </p:attrNameLst>
-                                      </p:cBhvr>
-                                      <p:to>
-                                        <p:strVal val="visible"/>
-                                      </p:to>
-                                    </p:set>
-                                    <p:anim calcmode="lin" valueType="num">
-                                      <p:cBhvr additive="base">
-                                        <p:cTn id="11" dur="500"/>
-                                        <p:tgtEl>
-                                          <p:spTgt spid="2">
-                                            <p:txEl>
-                                              <p:pRg st="0" end="0"/>
-                                            </p:txEl>
-                                          </p:spTgt>
-                                        </p:tgtEl>
-                                        <p:attrNameLst>
-                                          <p:attrName>ppt_y</p:attrName>
-                                        </p:attrNameLst>
-                                      </p:cBhvr>
-                                      <p:tavLst>
-                                        <p:tav tm="0">
-                                          <p:val>
-                                            <p:strVal val="#ppt_y+#ppt_h*1.125000"/>
-                                          </p:val>
-                                        </p:tav>
-                                        <p:tav tm="100000">
-                                          <p:val>
-                                            <p:strVal val="#ppt_y"/>
-                                          </p:val>
-                                        </p:tav>
-                                      </p:tavLst>
-                                    </p:anim>
-                                    <p:animEffect transition="in" filter="wipe(up)">
-                                      <p:cBhvr>
-                                        <p:cTn id="12" dur="500"/>
-                                        <p:tgtEl>
-                                          <p:spTgt spid="2">
-                                            <p:txEl>
-                                              <p:pRg st="0" end="0"/>
-                                            </p:txEl>
-                                          </p:spTgt>
-                                        </p:tgtEl>
-                                      </p:cBhvr>
-                                    </p:animEffect>
-                                  </p:childTnLst>
-                                </p:cTn>
-                              </p:par>
-                            </p:childTnLst>
-                          </p:cTn>
-                        </p:par>
-                      </p:childTnLst>
-                    </p:cTn>
-                  </p:par>
-                  <p:par>
-                    <p:cTn id="13" fill="hold">
-                      <p:stCondLst>
-                        <p:cond delay="indefinite"/>
-                      </p:stCondLst>
-                      <p:childTnLst>
-                        <p:par>
-                          <p:cTn id="14" fill="hold">
-                            <p:stCondLst>
-                              <p:cond delay="0"/>
-                            </p:stCondLst>
-                            <p:childTnLst>
-                              <p:par>
-                                <p:cTn id="15" presetID="12" presetClass="entr" presetSubtype="8" fill="hold" grpId="0" nodeType="clickEffect">
-                                  <p:stCondLst>
-                                    <p:cond delay="0"/>
-                                  </p:stCondLst>
-                                  <p:childTnLst>
-                                    <p:set>
-                                      <p:cBhvr>
-                                        <p:cTn id="16" dur="1" fill="hold">
-                                          <p:stCondLst>
-                                            <p:cond delay="0"/>
-                                          </p:stCondLst>
-                                        </p:cTn>
-                                        <p:tgtEl>
-                                          <p:spTgt spid="4"/>
-                                        </p:tgtEl>
-                                        <p:attrNameLst>
-                                          <p:attrName>style.visibility</p:attrName>
-                                        </p:attrNameLst>
-                                      </p:cBhvr>
-                                      <p:to>
-                                        <p:strVal val="visible"/>
-                                      </p:to>
-                                    </p:set>
-                                    <p:anim calcmode="lin" valueType="num">
-                                      <p:cBhvr additive="base">
-                                        <p:cTn id="17" dur="500"/>
-                                        <p:tgtEl>
-                                          <p:spTgt spid="4"/>
-                                        </p:tgtEl>
-                                        <p:attrNameLst>
-                                          <p:attrName>ppt_x</p:attrName>
-                                        </p:attrNameLst>
-                                      </p:cBhvr>
-                                      <p:tavLst>
-                                        <p:tav tm="0">
-                                          <p:val>
-                                            <p:strVal val="#ppt_x-#ppt_w*1.125000"/>
-                                          </p:val>
-                                        </p:tav>
-                                        <p:tav tm="100000">
-                                          <p:val>
-                                            <p:strVal val="#ppt_x"/>
-                                          </p:val>
-                                        </p:tav>
-                                      </p:tavLst>
-                                    </p:anim>
-                                    <p:animEffect transition="in" filter="wipe(right)">
-                                      <p:cBhvr>
-                                        <p:cTn id="18" dur="500"/>
-                                        <p:tgtEl>
-                                          <p:spTgt spid="4"/>
-                                        </p:tgtEl>
-                                      </p:cBhvr>
-                                    </p:animEffect>
-                                  </p:childTnLst>
-                                </p:cTn>
-                              </p:par>
-                            </p:childTnLst>
-                          </p:cTn>
-                        </p:par>
-                      </p:childTnLst>
-                    </p:cTn>
-                  </p:par>
-                  <p:par>
-                    <p:cTn id="19" fill="hold">
-                      <p:stCondLst>
-                        <p:cond delay="indefinite"/>
-                      </p:stCondLst>
-                      <p:childTnLst>
-                        <p:par>
-                          <p:cTn id="20" fill="hold">
-                            <p:stCondLst>
-                              <p:cond delay="0"/>
-                            </p:stCondLst>
-                            <p:childTnLst>
-                              <p:par>
-                                <p:cTn id="21" presetID="12" presetClass="entr" presetSubtype="8" fill="hold" grpId="0" nodeType="clickEffect">
-                                  <p:stCondLst>
-                                    <p:cond delay="0"/>
-                                  </p:stCondLst>
-                                  <p:iterate type="wd">
-                                    <p:tmPct val="10000"/>
-                                  </p:iterate>
-                                  <p:childTnLst>
-                                    <p:set>
-                                      <p:cBhvr>
-                                        <p:cTn id="22" dur="1" fill="hold">
-                                          <p:stCondLst>
-                                            <p:cond delay="0"/>
-                                          </p:stCondLst>
-                                        </p:cTn>
-                                        <p:tgtEl>
-                                          <p:spTgt spid="3"/>
-                                        </p:tgtEl>
-                                        <p:attrNameLst>
-                                          <p:attrName>style.visibility</p:attrName>
-                                        </p:attrNameLst>
-                                      </p:cBhvr>
-                                      <p:to>
-                                        <p:strVal val="visible"/>
-                                      </p:to>
-                                    </p:set>
-                                    <p:anim calcmode="lin" valueType="num">
-                                      <p:cBhvr additive="base">
-                                        <p:cTn id="23" dur="500"/>
-                                        <p:tgtEl>
-                                          <p:spTgt spid="3"/>
-                                        </p:tgtEl>
-                                        <p:attrNameLst>
-                                          <p:attrName>ppt_x</p:attrName>
-                                        </p:attrNameLst>
-                                      </p:cBhvr>
-                                      <p:tavLst>
-                                        <p:tav tm="0">
-                                          <p:val>
-                                            <p:strVal val="#ppt_x-#ppt_w*1.125000"/>
-                                          </p:val>
-                                        </p:tav>
-                                        <p:tav tm="100000">
-                                          <p:val>
-                                            <p:strVal val="#ppt_x"/>
-                                          </p:val>
-                                        </p:tav>
-                                      </p:tavLst>
-                                    </p:anim>
-                                    <p:animEffect transition="in" filter="wipe(right)">
-                                      <p:cBhvr>
-                                        <p:cTn id="24" dur="500"/>
-                                        <p:tgtEl>
-                                          <p:spTgt spid="3"/>
-                                        </p:tgtEl>
-                                      </p:cBhvr>
-                                    </p:animEffect>
-                                  </p:childTnLst>
-                                  <p:subTnLst>
-                                    <p:audio>
-                                      <p:cMediaNode>
-                                        <p:cTn display="0" masterRel="sameClick">
-                                          <p:stCondLst>
-                                            <p:cond evt="begin" delay="0">
-                                              <p:tn val="21"/>
-                                            </p:cond>
-                                          </p:stCondLst>
-                                          <p:endCondLst>
-                                            <p:cond evt="onStopAudio" delay="0">
-                                              <p:tgtEl>
-                                                <p:sldTgt/>
-                                              </p:tgtEl>
-                                            </p:cond>
-                                          </p:endCondLst>
-                                        </p:cTn>
-                                        <p:tgtEl>
-                                          <p:sndTgt r:embed="rId3" name="camera.wav"/>
-                                        </p:tgtEl>
-                                      </p:cMediaNode>
-                                    </p:audio>
-                                  </p:subTnLst>
-                                </p:cTn>
-                              </p:par>
-                            </p:childTnLst>
-                          </p:cTn>
-                        </p:par>
-                      </p:childTnLst>
-                    </p:cTn>
-                  </p:par>
-                  <p:par>
-                    <p:cTn id="25" fill="hold">
-                      <p:stCondLst>
-                        <p:cond delay="indefinite"/>
-                      </p:stCondLst>
-                      <p:childTnLst>
-                        <p:par>
-                          <p:cTn id="26" fill="hold">
-                            <p:stCondLst>
-                              <p:cond delay="0"/>
-                            </p:stCondLst>
-                            <p:childTnLst>
-                              <p:par>
-                                <p:cTn id="27" presetID="12" presetClass="entr" presetSubtype="4" fill="hold" nodeType="clickEffect">
-                                  <p:stCondLst>
-                                    <p:cond delay="0"/>
-                                  </p:stCondLst>
-                                  <p:childTnLst>
-                                    <p:set>
-                                      <p:cBhvr>
-                                        <p:cTn id="28" dur="1" fill="hold">
-                                          <p:stCondLst>
-                                            <p:cond delay="0"/>
-                                          </p:stCondLst>
-                                        </p:cTn>
-                                        <p:tgtEl>
-                                          <p:spTgt spid="7"/>
-                                        </p:tgtEl>
-                                        <p:attrNameLst>
-                                          <p:attrName>style.visibility</p:attrName>
-                                        </p:attrNameLst>
-                                      </p:cBhvr>
-                                      <p:to>
-                                        <p:strVal val="visible"/>
-                                      </p:to>
-                                    </p:set>
-                                    <p:anim calcmode="lin" valueType="num">
-                                      <p:cBhvr additive="base">
-                                        <p:cTn id="29" dur="500"/>
-                                        <p:tgtEl>
-                                          <p:spTgt spid="7"/>
-                                        </p:tgtEl>
-                                        <p:attrNameLst>
-                                          <p:attrName>ppt_y</p:attrName>
-                                        </p:attrNameLst>
-                                      </p:cBhvr>
-                                      <p:tavLst>
-                                        <p:tav tm="0">
-                                          <p:val>
-                                            <p:strVal val="#ppt_y+#ppt_h*1.125000"/>
-                                          </p:val>
-                                        </p:tav>
-                                        <p:tav tm="100000">
-                                          <p:val>
-                                            <p:strVal val="#ppt_y"/>
-                                          </p:val>
-                                        </p:tav>
-                                      </p:tavLst>
-                                    </p:anim>
-                                    <p:animEffect transition="in" filter="wipe(up)">
-                                      <p:cBhvr>
-                                        <p:cTn id="30" dur="500"/>
-                                        <p:tgtEl>
-                                          <p:spTgt spid="7"/>
-                                        </p:tgtEl>
-                                      </p:cBhvr>
-                                    </p:animEffect>
-                                  </p:childTnLst>
-                                </p:cTn>
-                              </p:par>
-                            </p:childTnLst>
-                          </p:cTn>
-                        </p:par>
-                      </p:childTnLst>
-                    </p:cTn>
-                  </p:par>
-                </p:childTnLst>
-              </p:cTn>
-              <p:prevCondLst>
-                <p:cond evt="onPrev" delay="0">
-                  <p:tgtEl>
-                    <p:sldTgt/>
-                  </p:tgtEl>
-                </p:cond>
-              </p:prevCondLst>
-              <p:nextCondLst>
-                <p:cond evt="onNext" delay="0">
-                  <p:tgtEl>
-                    <p:sldTgt/>
-                  </p:tgtEl>
-                </p:cond>
-              </p:nextCondLst>
-            </p:seq>
-          </p:childTnLst>
-        </p:cTn>
+        <p:cTn id="1" dur="indefinite" restart="never" nodeType="tmRoot"/>
       </p:par>
     </p:tnLst>
-    <p:bldLst>
-      <p:bldP spid="2" grpId="0" build="allAtOnce"/>
-      <p:bldP spid="3" grpId="0"/>
-      <p:bldP spid="4" grpId="0"/>
-      <p:bldP spid="8" grpId="0"/>
-    </p:bldLst>
   </p:timing>
 </p:sld>
 </file>
@@ -4556,7 +4113,7 @@
         </p:nvSpPr>
         <p:spPr>
           <a:xfrm>
-            <a:off x="4038599" y="4406863"/>
+            <a:off x="0" y="6356349"/>
             <a:ext cx="4114800" cy="365125"/>
           </a:xfrm>
         </p:spPr>
@@ -4649,249 +4206,12 @@
   <p:clrMapOvr>
     <a:masterClrMapping/>
   </p:clrMapOvr>
-  <mc:AlternateContent xmlns:mc="http://schemas.openxmlformats.org/markup-compatibility/2006">
-    <mc:Choice xmlns:p14="http://schemas.microsoft.com/office/powerpoint/2010/main" Requires="p14">
-      <p:transition spd="slow" p14:dur="4000">
-        <p14:vortex dir="r"/>
-      </p:transition>
-    </mc:Choice>
-    <mc:Fallback>
-      <p:transition spd="slow">
-        <p:fade/>
-      </p:transition>
-    </mc:Fallback>
-  </mc:AlternateContent>
   <p:timing>
     <p:tnLst>
       <p:par>
-        <p:cTn id="1" dur="indefinite" restart="never" nodeType="tmRoot">
-          <p:childTnLst>
-            <p:seq concurrent="1" nextAc="seek">
-              <p:cTn id="2" dur="indefinite" nodeType="mainSeq">
-                <p:childTnLst>
-                  <p:par>
-                    <p:cTn id="3" fill="hold">
-                      <p:stCondLst>
-                        <p:cond delay="indefinite"/>
-                      </p:stCondLst>
-                      <p:childTnLst>
-                        <p:par>
-                          <p:cTn id="4" fill="hold">
-                            <p:stCondLst>
-                              <p:cond delay="0"/>
-                            </p:stCondLst>
-                            <p:childTnLst>
-                              <p:par>
-                                <p:cTn id="5" presetID="53" presetClass="entr" presetSubtype="16" fill="hold" grpId="0" nodeType="clickEffect">
-                                  <p:stCondLst>
-                                    <p:cond delay="250"/>
-                                  </p:stCondLst>
-                                  <p:childTnLst>
-                                    <p:set>
-                                      <p:cBhvr>
-                                        <p:cTn id="6" dur="1" fill="hold">
-                                          <p:stCondLst>
-                                            <p:cond delay="0"/>
-                                          </p:stCondLst>
-                                        </p:cTn>
-                                        <p:tgtEl>
-                                          <p:spTgt spid="2"/>
-                                        </p:tgtEl>
-                                        <p:attrNameLst>
-                                          <p:attrName>style.visibility</p:attrName>
-                                        </p:attrNameLst>
-                                      </p:cBhvr>
-                                      <p:to>
-                                        <p:strVal val="visible"/>
-                                      </p:to>
-                                    </p:set>
-                                    <p:anim calcmode="lin" valueType="num">
-                                      <p:cBhvr>
-                                        <p:cTn id="7" dur="250" fill="hold"/>
-                                        <p:tgtEl>
-                                          <p:spTgt spid="2"/>
-                                        </p:tgtEl>
-                                        <p:attrNameLst>
-                                          <p:attrName>ppt_w</p:attrName>
-                                        </p:attrNameLst>
-                                      </p:cBhvr>
-                                      <p:tavLst>
-                                        <p:tav tm="0">
-                                          <p:val>
-                                            <p:fltVal val="0"/>
-                                          </p:val>
-                                        </p:tav>
-                                        <p:tav tm="100000">
-                                          <p:val>
-                                            <p:strVal val="#ppt_w"/>
-                                          </p:val>
-                                        </p:tav>
-                                      </p:tavLst>
-                                    </p:anim>
-                                    <p:anim calcmode="lin" valueType="num">
-                                      <p:cBhvr>
-                                        <p:cTn id="8" dur="250" fill="hold"/>
-                                        <p:tgtEl>
-                                          <p:spTgt spid="2"/>
-                                        </p:tgtEl>
-                                        <p:attrNameLst>
-                                          <p:attrName>ppt_h</p:attrName>
-                                        </p:attrNameLst>
-                                      </p:cBhvr>
-                                      <p:tavLst>
-                                        <p:tav tm="0">
-                                          <p:val>
-                                            <p:fltVal val="0"/>
-                                          </p:val>
-                                        </p:tav>
-                                        <p:tav tm="100000">
-                                          <p:val>
-                                            <p:strVal val="#ppt_h"/>
-                                          </p:val>
-                                        </p:tav>
-                                      </p:tavLst>
-                                    </p:anim>
-                                    <p:animEffect transition="in" filter="fade">
-                                      <p:cBhvr>
-                                        <p:cTn id="9" dur="250"/>
-                                        <p:tgtEl>
-                                          <p:spTgt spid="2"/>
-                                        </p:tgtEl>
-                                      </p:cBhvr>
-                                    </p:animEffect>
-                                  </p:childTnLst>
-                                </p:cTn>
-                              </p:par>
-                            </p:childTnLst>
-                          </p:cTn>
-                        </p:par>
-                      </p:childTnLst>
-                    </p:cTn>
-                  </p:par>
-                  <p:par>
-                    <p:cTn id="10" fill="hold">
-                      <p:stCondLst>
-                        <p:cond delay="indefinite"/>
-                      </p:stCondLst>
-                      <p:childTnLst>
-                        <p:par>
-                          <p:cTn id="11" fill="hold">
-                            <p:stCondLst>
-                              <p:cond delay="0"/>
-                            </p:stCondLst>
-                            <p:childTnLst>
-                              <p:par>
-                                <p:cTn id="12" presetID="53" presetClass="entr" presetSubtype="16" fill="hold" grpId="0" nodeType="clickEffect">
-                                  <p:stCondLst>
-                                    <p:cond delay="0"/>
-                                  </p:stCondLst>
-                                  <p:childTnLst>
-                                    <p:set>
-                                      <p:cBhvr>
-                                        <p:cTn id="13" dur="1" fill="hold">
-                                          <p:stCondLst>
-                                            <p:cond delay="0"/>
-                                          </p:stCondLst>
-                                        </p:cTn>
-                                        <p:tgtEl>
-                                          <p:spTgt spid="4"/>
-                                        </p:tgtEl>
-                                        <p:attrNameLst>
-                                          <p:attrName>style.visibility</p:attrName>
-                                        </p:attrNameLst>
-                                      </p:cBhvr>
-                                      <p:to>
-                                        <p:strVal val="visible"/>
-                                      </p:to>
-                                    </p:set>
-                                    <p:anim calcmode="lin" valueType="num">
-                                      <p:cBhvr>
-                                        <p:cTn id="14" dur="500" fill="hold"/>
-                                        <p:tgtEl>
-                                          <p:spTgt spid="4"/>
-                                        </p:tgtEl>
-                                        <p:attrNameLst>
-                                          <p:attrName>ppt_w</p:attrName>
-                                        </p:attrNameLst>
-                                      </p:cBhvr>
-                                      <p:tavLst>
-                                        <p:tav tm="0">
-                                          <p:val>
-                                            <p:fltVal val="0"/>
-                                          </p:val>
-                                        </p:tav>
-                                        <p:tav tm="100000">
-                                          <p:val>
-                                            <p:strVal val="#ppt_w"/>
-                                          </p:val>
-                                        </p:tav>
-                                      </p:tavLst>
-                                    </p:anim>
-                                    <p:anim calcmode="lin" valueType="num">
-                                      <p:cBhvr>
-                                        <p:cTn id="15" dur="500" fill="hold"/>
-                                        <p:tgtEl>
-                                          <p:spTgt spid="4"/>
-                                        </p:tgtEl>
-                                        <p:attrNameLst>
-                                          <p:attrName>ppt_h</p:attrName>
-                                        </p:attrNameLst>
-                                      </p:cBhvr>
-                                      <p:tavLst>
-                                        <p:tav tm="0">
-                                          <p:val>
-                                            <p:fltVal val="0"/>
-                                          </p:val>
-                                        </p:tav>
-                                        <p:tav tm="100000">
-                                          <p:val>
-                                            <p:strVal val="#ppt_h"/>
-                                          </p:val>
-                                        </p:tav>
-                                      </p:tavLst>
-                                    </p:anim>
-                                    <p:animEffect transition="in" filter="fade">
-                                      <p:cBhvr>
-                                        <p:cTn id="16" dur="500"/>
-                                        <p:tgtEl>
-                                          <p:spTgt spid="4"/>
-                                        </p:tgtEl>
-                                      </p:cBhvr>
-                                    </p:animEffect>
-                                  </p:childTnLst>
-                                </p:cTn>
-                              </p:par>
-                            </p:childTnLst>
-                          </p:cTn>
-                        </p:par>
-                      </p:childTnLst>
-                    </p:cTn>
-                  </p:par>
-                </p:childTnLst>
-              </p:cTn>
-              <p:prevCondLst>
-                <p:cond evt="onPrev" delay="0">
-                  <p:tgtEl>
-                    <p:sldTgt/>
-                  </p:tgtEl>
-                </p:cond>
-              </p:prevCondLst>
-              <p:nextCondLst>
-                <p:cond evt="onNext" delay="0">
-                  <p:tgtEl>
-                    <p:sldTgt/>
-                  </p:tgtEl>
-                </p:cond>
-              </p:nextCondLst>
-            </p:seq>
-          </p:childTnLst>
-        </p:cTn>
+        <p:cTn id="1" dur="indefinite" restart="never" nodeType="tmRoot"/>
       </p:par>
     </p:tnLst>
-    <p:bldLst>
-      <p:bldP spid="2" grpId="0"/>
-      <p:bldP spid="4" grpId="0"/>
-    </p:bldLst>
   </p:timing>
 </p:sld>
 </file>
@@ -4913,6 +4233,34 @@
           <a:chExt cx="0" cy="0"/>
         </a:xfrm>
       </p:grpSpPr>
+      <p:sp>
+        <p:nvSpPr>
+          <p:cNvPr id="4" name="Footer Placeholder 3"/>
+          <p:cNvSpPr>
+            <a:spLocks noGrp="1"/>
+          </p:cNvSpPr>
+          <p:nvPr>
+            <p:ph type="ftr" sz="quarter" idx="11"/>
+          </p:nvPr>
+        </p:nvSpPr>
+        <p:spPr>
+          <a:xfrm>
+            <a:off x="0" y="6356350"/>
+            <a:ext cx="4114800" cy="365125"/>
+          </a:xfrm>
+        </p:spPr>
+        <p:txBody>
+          <a:bodyPr/>
+          <a:lstStyle/>
+          <a:p>
+            <a:r>
+              <a:rPr lang="en-US" dirty="0" smtClean="0"/>
+              <a:t>16 March, 2025</a:t>
+            </a:r>
+            <a:endParaRPr lang="en-US" dirty="0"/>
+          </a:p>
+        </p:txBody>
+      </p:sp>
       <p:sp>
         <p:nvSpPr>
           <p:cNvPr id="5" name="Slide Number Placeholder 4"/>
@@ -5129,427 +4477,19 @@
     </p:spTree>
     <p:extLst>
       <p:ext uri="{BB962C8B-B14F-4D97-AF65-F5344CB8AC3E}">
-        <p14:creationId xmlns:p14="http://schemas.microsoft.com/office/powerpoint/2010/main" val="1729881605"/>
+        <p14:creationId xmlns:p14="http://schemas.microsoft.com/office/powerpoint/2010/main" val="2589414248"/>
       </p:ext>
     </p:extLst>
   </p:cSld>
   <p:clrMapOvr>
     <a:masterClrMapping/>
   </p:clrMapOvr>
-  <mc:AlternateContent xmlns:mc="http://schemas.openxmlformats.org/markup-compatibility/2006">
-    <mc:Choice xmlns:p14="http://schemas.microsoft.com/office/powerpoint/2010/main" Requires="p14">
-      <p:transition spd="slow" p14:dur="4400">
-        <p14:honeycomb/>
-      </p:transition>
-    </mc:Choice>
-    <mc:Fallback>
-      <p:transition spd="slow">
-        <p:fade/>
-      </p:transition>
-    </mc:Fallback>
-  </mc:AlternateContent>
   <p:timing>
     <p:tnLst>
       <p:par>
-        <p:cTn id="1" dur="indefinite" restart="never" nodeType="tmRoot">
-          <p:childTnLst>
-            <p:seq concurrent="1" nextAc="seek">
-              <p:cTn id="2" dur="indefinite" nodeType="mainSeq">
-                <p:childTnLst>
-                  <p:par>
-                    <p:cTn id="3" fill="hold">
-                      <p:stCondLst>
-                        <p:cond delay="indefinite"/>
-                      </p:stCondLst>
-                      <p:childTnLst>
-                        <p:par>
-                          <p:cTn id="4" fill="hold">
-                            <p:stCondLst>
-                              <p:cond delay="0"/>
-                            </p:stCondLst>
-                            <p:childTnLst>
-                              <p:par>
-                                <p:cTn id="5" presetID="53" presetClass="entr" presetSubtype="528" fill="hold" nodeType="clickEffect">
-                                  <p:stCondLst>
-                                    <p:cond delay="0"/>
-                                  </p:stCondLst>
-                                  <p:childTnLst>
-                                    <p:set>
-                                      <p:cBhvr>
-                                        <p:cTn id="6" dur="1" fill="hold">
-                                          <p:stCondLst>
-                                            <p:cond delay="0"/>
-                                          </p:stCondLst>
-                                        </p:cTn>
-                                        <p:tgtEl>
-                                          <p:spTgt spid="9"/>
-                                        </p:tgtEl>
-                                        <p:attrNameLst>
-                                          <p:attrName>style.visibility</p:attrName>
-                                        </p:attrNameLst>
-                                      </p:cBhvr>
-                                      <p:to>
-                                        <p:strVal val="visible"/>
-                                      </p:to>
-                                    </p:set>
-                                    <p:anim calcmode="lin" valueType="num">
-                                      <p:cBhvr>
-                                        <p:cTn id="7" dur="500" fill="hold"/>
-                                        <p:tgtEl>
-                                          <p:spTgt spid="9"/>
-                                        </p:tgtEl>
-                                        <p:attrNameLst>
-                                          <p:attrName>ppt_w</p:attrName>
-                                        </p:attrNameLst>
-                                      </p:cBhvr>
-                                      <p:tavLst>
-                                        <p:tav tm="0">
-                                          <p:val>
-                                            <p:fltVal val="0"/>
-                                          </p:val>
-                                        </p:tav>
-                                        <p:tav tm="100000">
-                                          <p:val>
-                                            <p:strVal val="#ppt_w"/>
-                                          </p:val>
-                                        </p:tav>
-                                      </p:tavLst>
-                                    </p:anim>
-                                    <p:anim calcmode="lin" valueType="num">
-                                      <p:cBhvr>
-                                        <p:cTn id="8" dur="500" fill="hold"/>
-                                        <p:tgtEl>
-                                          <p:spTgt spid="9"/>
-                                        </p:tgtEl>
-                                        <p:attrNameLst>
-                                          <p:attrName>ppt_h</p:attrName>
-                                        </p:attrNameLst>
-                                      </p:cBhvr>
-                                      <p:tavLst>
-                                        <p:tav tm="0">
-                                          <p:val>
-                                            <p:fltVal val="0"/>
-                                          </p:val>
-                                        </p:tav>
-                                        <p:tav tm="100000">
-                                          <p:val>
-                                            <p:strVal val="#ppt_h"/>
-                                          </p:val>
-                                        </p:tav>
-                                      </p:tavLst>
-                                    </p:anim>
-                                    <p:animEffect transition="in" filter="fade">
-                                      <p:cBhvr>
-                                        <p:cTn id="9" dur="500"/>
-                                        <p:tgtEl>
-                                          <p:spTgt spid="9"/>
-                                        </p:tgtEl>
-                                      </p:cBhvr>
-                                    </p:animEffect>
-                                    <p:anim calcmode="lin" valueType="num">
-                                      <p:cBhvr>
-                                        <p:cTn id="10" dur="500" fill="hold"/>
-                                        <p:tgtEl>
-                                          <p:spTgt spid="9"/>
-                                        </p:tgtEl>
-                                        <p:attrNameLst>
-                                          <p:attrName>ppt_x</p:attrName>
-                                        </p:attrNameLst>
-                                      </p:cBhvr>
-                                      <p:tavLst>
-                                        <p:tav tm="0">
-                                          <p:val>
-                                            <p:fltVal val="0.5"/>
-                                          </p:val>
-                                        </p:tav>
-                                        <p:tav tm="100000">
-                                          <p:val>
-                                            <p:strVal val="#ppt_x"/>
-                                          </p:val>
-                                        </p:tav>
-                                      </p:tavLst>
-                                    </p:anim>
-                                    <p:anim calcmode="lin" valueType="num">
-                                      <p:cBhvr>
-                                        <p:cTn id="11" dur="500" fill="hold"/>
-                                        <p:tgtEl>
-                                          <p:spTgt spid="9"/>
-                                        </p:tgtEl>
-                                        <p:attrNameLst>
-                                          <p:attrName>ppt_y</p:attrName>
-                                        </p:attrNameLst>
-                                      </p:cBhvr>
-                                      <p:tavLst>
-                                        <p:tav tm="0">
-                                          <p:val>
-                                            <p:fltVal val="0.5"/>
-                                          </p:val>
-                                        </p:tav>
-                                        <p:tav tm="100000">
-                                          <p:val>
-                                            <p:strVal val="#ppt_y"/>
-                                          </p:val>
-                                        </p:tav>
-                                      </p:tavLst>
-                                    </p:anim>
-                                  </p:childTnLst>
-                                </p:cTn>
-                              </p:par>
-                            </p:childTnLst>
-                          </p:cTn>
-                        </p:par>
-                      </p:childTnLst>
-                    </p:cTn>
-                  </p:par>
-                  <p:par>
-                    <p:cTn id="12" fill="hold">
-                      <p:stCondLst>
-                        <p:cond delay="indefinite"/>
-                      </p:stCondLst>
-                      <p:childTnLst>
-                        <p:par>
-                          <p:cTn id="13" fill="hold">
-                            <p:stCondLst>
-                              <p:cond delay="0"/>
-                            </p:stCondLst>
-                            <p:childTnLst>
-                              <p:par>
-                                <p:cTn id="14" presetID="12" presetClass="entr" presetSubtype="4" fill="hold" grpId="0" nodeType="clickEffect">
-                                  <p:stCondLst>
-                                    <p:cond delay="0"/>
-                                  </p:stCondLst>
-                                  <p:childTnLst>
-                                    <p:set>
-                                      <p:cBhvr>
-                                        <p:cTn id="15" dur="1" fill="hold">
-                                          <p:stCondLst>
-                                            <p:cond delay="0"/>
-                                          </p:stCondLst>
-                                        </p:cTn>
-                                        <p:tgtEl>
-                                          <p:spTgt spid="6"/>
-                                        </p:tgtEl>
-                                        <p:attrNameLst>
-                                          <p:attrName>style.visibility</p:attrName>
-                                        </p:attrNameLst>
-                                      </p:cBhvr>
-                                      <p:to>
-                                        <p:strVal val="visible"/>
-                                      </p:to>
-                                    </p:set>
-                                    <p:anim calcmode="lin" valueType="num">
-                                      <p:cBhvr additive="base">
-                                        <p:cTn id="16" dur="500"/>
-                                        <p:tgtEl>
-                                          <p:spTgt spid="6"/>
-                                        </p:tgtEl>
-                                        <p:attrNameLst>
-                                          <p:attrName>ppt_y</p:attrName>
-                                        </p:attrNameLst>
-                                      </p:cBhvr>
-                                      <p:tavLst>
-                                        <p:tav tm="0">
-                                          <p:val>
-                                            <p:strVal val="#ppt_y+#ppt_h*1.125000"/>
-                                          </p:val>
-                                        </p:tav>
-                                        <p:tav tm="100000">
-                                          <p:val>
-                                            <p:strVal val="#ppt_y"/>
-                                          </p:val>
-                                        </p:tav>
-                                      </p:tavLst>
-                                    </p:anim>
-                                    <p:animEffect transition="in" filter="wipe(up)">
-                                      <p:cBhvr>
-                                        <p:cTn id="17" dur="500"/>
-                                        <p:tgtEl>
-                                          <p:spTgt spid="6"/>
-                                        </p:tgtEl>
-                                      </p:cBhvr>
-                                    </p:animEffect>
-                                  </p:childTnLst>
-                                </p:cTn>
-                              </p:par>
-                            </p:childTnLst>
-                          </p:cTn>
-                        </p:par>
-                      </p:childTnLst>
-                    </p:cTn>
-                  </p:par>
-                  <p:par>
-                    <p:cTn id="18" fill="hold">
-                      <p:stCondLst>
-                        <p:cond delay="indefinite"/>
-                      </p:stCondLst>
-                      <p:childTnLst>
-                        <p:par>
-                          <p:cTn id="19" fill="hold">
-                            <p:stCondLst>
-                              <p:cond delay="0"/>
-                            </p:stCondLst>
-                            <p:childTnLst>
-                              <p:par>
-                                <p:cTn id="20" presetID="52" presetClass="exit" presetSubtype="0" fill="hold" nodeType="clickEffect">
-                                  <p:stCondLst>
-                                    <p:cond delay="0"/>
-                                  </p:stCondLst>
-                                  <p:childTnLst>
-                                    <p:animScale>
-                                      <p:cBhvr>
-                                        <p:cTn id="21" dur="1000" accel="50000">
-                                          <p:stCondLst>
-                                            <p:cond delay="0"/>
-                                          </p:stCondLst>
-                                        </p:cTn>
-                                        <p:tgtEl>
-                                          <p:spTgt spid="9"/>
-                                        </p:tgtEl>
-                                      </p:cBhvr>
-                                      <p:from x="100000" y="100000"/>
-                                      <p:to x="250000" y="250000"/>
-                                    </p:animScale>
-                                    <p:animMotion origin="layout" path="M 0.0000 0.0000 C 0.03802 0.0 0.1441 0.02341 0.1826 0.0915 C 0.22118 0.15964 0.24705 0.31256 0.2318 0.4083 C 0.21649 0.50394 0.20747 0.57948 0.0908 0.6661 C -0.02552 0.75279 -0.37517 0.88508 -0.4674 0.9289" pathEditMode="relative" ptsTypes="">
-                                      <p:cBhvr>
-                                        <p:cTn id="22" dur="1000" accel="50000">
-                                          <p:stCondLst>
-                                            <p:cond delay="0"/>
-                                          </p:stCondLst>
-                                        </p:cTn>
-                                        <p:tgtEl>
-                                          <p:spTgt spid="9"/>
-                                        </p:tgtEl>
-                                        <p:attrNameLst>
-                                          <p:attrName>ppt_x</p:attrName>
-                                          <p:attrName>ppt_y</p:attrName>
-                                        </p:attrNameLst>
-                                      </p:cBhvr>
-                                    </p:animMotion>
-                                    <p:animEffect transition="out" filter="fade">
-                                      <p:cBhvr>
-                                        <p:cTn id="23" dur="1000"/>
-                                        <p:tgtEl>
-                                          <p:spTgt spid="9"/>
-                                        </p:tgtEl>
-                                      </p:cBhvr>
-                                    </p:animEffect>
-                                    <p:set>
-                                      <p:cBhvr>
-                                        <p:cTn id="24" dur="1" fill="hold">
-                                          <p:stCondLst>
-                                            <p:cond delay="999"/>
-                                          </p:stCondLst>
-                                        </p:cTn>
-                                        <p:tgtEl>
-                                          <p:spTgt spid="9"/>
-                                        </p:tgtEl>
-                                        <p:attrNameLst>
-                                          <p:attrName>style.visibility</p:attrName>
-                                        </p:attrNameLst>
-                                      </p:cBhvr>
-                                      <p:to>
-                                        <p:strVal val="hidden"/>
-                                      </p:to>
-                                    </p:set>
-                                  </p:childTnLst>
-                                </p:cTn>
-                              </p:par>
-                              <p:par>
-                                <p:cTn id="25" presetID="52" presetClass="exit" presetSubtype="0" fill="hold" grpId="1" nodeType="withEffect">
-                                  <p:stCondLst>
-                                    <p:cond delay="0"/>
-                                  </p:stCondLst>
-                                  <p:childTnLst>
-                                    <p:animScale>
-                                      <p:cBhvr>
-                                        <p:cTn id="26" dur="1000" accel="50000">
-                                          <p:stCondLst>
-                                            <p:cond delay="0"/>
-                                          </p:stCondLst>
-                                        </p:cTn>
-                                        <p:tgtEl>
-                                          <p:spTgt spid="6"/>
-                                        </p:tgtEl>
-                                      </p:cBhvr>
-                                      <p:from x="100000" y="100000"/>
-                                      <p:to x="250000" y="250000"/>
-                                    </p:animScale>
-                                    <p:animMotion origin="layout" path="M 0.0000 0.0000 C 0.03802 0.0 0.1441 0.02341 0.1826 0.0915 C 0.22118 0.15964 0.24705 0.31256 0.2318 0.4083 C 0.21649 0.50394 0.20747 0.57948 0.0908 0.6661 C -0.02552 0.75279 -0.37517 0.88508 -0.4674 0.9289" pathEditMode="relative" ptsTypes="">
-                                      <p:cBhvr>
-                                        <p:cTn id="27" dur="1000" accel="50000">
-                                          <p:stCondLst>
-                                            <p:cond delay="0"/>
-                                          </p:stCondLst>
-                                        </p:cTn>
-                                        <p:tgtEl>
-                                          <p:spTgt spid="6"/>
-                                        </p:tgtEl>
-                                        <p:attrNameLst>
-                                          <p:attrName>ppt_x</p:attrName>
-                                          <p:attrName>ppt_y</p:attrName>
-                                        </p:attrNameLst>
-                                      </p:cBhvr>
-                                    </p:animMotion>
-                                    <p:animEffect transition="out" filter="fade">
-                                      <p:cBhvr>
-                                        <p:cTn id="28" dur="1000"/>
-                                        <p:tgtEl>
-                                          <p:spTgt spid="6"/>
-                                        </p:tgtEl>
-                                      </p:cBhvr>
-                                    </p:animEffect>
-                                    <p:set>
-                                      <p:cBhvr>
-                                        <p:cTn id="29" dur="1" fill="hold">
-                                          <p:stCondLst>
-                                            <p:cond delay="999"/>
-                                          </p:stCondLst>
-                                        </p:cTn>
-                                        <p:tgtEl>
-                                          <p:spTgt spid="6"/>
-                                        </p:tgtEl>
-                                        <p:attrNameLst>
-                                          <p:attrName>style.visibility</p:attrName>
-                                        </p:attrNameLst>
-                                      </p:cBhvr>
-                                      <p:to>
-                                        <p:strVal val="hidden"/>
-                                      </p:to>
-                                    </p:set>
-                                  </p:childTnLst>
-                                </p:cTn>
-                              </p:par>
-                            </p:childTnLst>
-                          </p:cTn>
-                        </p:par>
-                      </p:childTnLst>
-                    </p:cTn>
-                  </p:par>
-                </p:childTnLst>
-              </p:cTn>
-              <p:prevCondLst>
-                <p:cond evt="onPrev" delay="0">
-                  <p:tgtEl>
-                    <p:sldTgt/>
-                  </p:tgtEl>
-                </p:cond>
-              </p:prevCondLst>
-              <p:nextCondLst>
-                <p:cond evt="onNext" delay="0">
-                  <p:tgtEl>
-                    <p:sldTgt/>
-                  </p:tgtEl>
-                </p:cond>
-              </p:nextCondLst>
-            </p:seq>
-          </p:childTnLst>
-        </p:cTn>
+        <p:cTn id="1" dur="indefinite" restart="never" nodeType="tmRoot"/>
       </p:par>
     </p:tnLst>
-    <p:bldLst>
-      <p:bldP spid="6" grpId="0"/>
-      <p:bldP spid="6" grpId="1"/>
-    </p:bldLst>
   </p:timing>
 </p:sld>
 </file>
@@ -5571,6 +4511,34 @@
           <a:chExt cx="0" cy="0"/>
         </a:xfrm>
       </p:grpSpPr>
+      <p:sp>
+        <p:nvSpPr>
+          <p:cNvPr id="2" name="Footer Placeholder 1"/>
+          <p:cNvSpPr>
+            <a:spLocks noGrp="1"/>
+          </p:cNvSpPr>
+          <p:nvPr>
+            <p:ph type="ftr" sz="quarter" idx="11"/>
+          </p:nvPr>
+        </p:nvSpPr>
+        <p:spPr>
+          <a:xfrm>
+            <a:off x="0" y="6356350"/>
+            <a:ext cx="4114800" cy="365125"/>
+          </a:xfrm>
+        </p:spPr>
+        <p:txBody>
+          <a:bodyPr/>
+          <a:lstStyle/>
+          <a:p>
+            <a:r>
+              <a:rPr lang="en-US" dirty="0" smtClean="0"/>
+              <a:t>16 March, 2025</a:t>
+            </a:r>
+            <a:endParaRPr lang="en-US" dirty="0"/>
+          </a:p>
+        </p:txBody>
+      </p:sp>
       <p:sp>
         <p:nvSpPr>
           <p:cNvPr id="3" name="Slide Number Placeholder 2"/>
@@ -5793,374 +4761,12 @@
   <p:clrMapOvr>
     <a:masterClrMapping/>
   </p:clrMapOvr>
-  <mc:AlternateContent xmlns:mc="http://schemas.openxmlformats.org/markup-compatibility/2006">
-    <mc:Choice xmlns:p14="http://schemas.microsoft.com/office/powerpoint/2010/main" Requires="p14">
-      <p:transition spd="slow" p14:dur="1400">
-        <p14:ripple/>
-      </p:transition>
-    </mc:Choice>
-    <mc:Fallback>
-      <p:transition spd="slow">
-        <p:fade/>
-      </p:transition>
-    </mc:Fallback>
-  </mc:AlternateContent>
   <p:timing>
     <p:tnLst>
       <p:par>
-        <p:cTn id="1" dur="indefinite" restart="never" nodeType="tmRoot">
-          <p:childTnLst>
-            <p:seq concurrent="1" nextAc="seek">
-              <p:cTn id="2" dur="indefinite" nodeType="mainSeq">
-                <p:childTnLst>
-                  <p:par>
-                    <p:cTn id="3" fill="hold">
-                      <p:stCondLst>
-                        <p:cond delay="indefinite"/>
-                      </p:stCondLst>
-                      <p:childTnLst>
-                        <p:par>
-                          <p:cTn id="4" fill="hold">
-                            <p:stCondLst>
-                              <p:cond delay="0"/>
-                            </p:stCondLst>
-                            <p:childTnLst>
-                              <p:par>
-                                <p:cTn id="5" presetID="53" presetClass="entr" presetSubtype="16" fill="hold" nodeType="clickEffect">
-                                  <p:stCondLst>
-                                    <p:cond delay="0"/>
-                                  </p:stCondLst>
-                                  <p:childTnLst>
-                                    <p:set>
-                                      <p:cBhvr>
-                                        <p:cTn id="6" dur="1" fill="hold">
-                                          <p:stCondLst>
-                                            <p:cond delay="0"/>
-                                          </p:stCondLst>
-                                        </p:cTn>
-                                        <p:tgtEl>
-                                          <p:spTgt spid="9"/>
-                                        </p:tgtEl>
-                                        <p:attrNameLst>
-                                          <p:attrName>style.visibility</p:attrName>
-                                        </p:attrNameLst>
-                                      </p:cBhvr>
-                                      <p:to>
-                                        <p:strVal val="visible"/>
-                                      </p:to>
-                                    </p:set>
-                                    <p:anim calcmode="lin" valueType="num">
-                                      <p:cBhvr>
-                                        <p:cTn id="7" dur="500" fill="hold"/>
-                                        <p:tgtEl>
-                                          <p:spTgt spid="9"/>
-                                        </p:tgtEl>
-                                        <p:attrNameLst>
-                                          <p:attrName>ppt_w</p:attrName>
-                                        </p:attrNameLst>
-                                      </p:cBhvr>
-                                      <p:tavLst>
-                                        <p:tav tm="0">
-                                          <p:val>
-                                            <p:fltVal val="0"/>
-                                          </p:val>
-                                        </p:tav>
-                                        <p:tav tm="100000">
-                                          <p:val>
-                                            <p:strVal val="#ppt_w"/>
-                                          </p:val>
-                                        </p:tav>
-                                      </p:tavLst>
-                                    </p:anim>
-                                    <p:anim calcmode="lin" valueType="num">
-                                      <p:cBhvr>
-                                        <p:cTn id="8" dur="500" fill="hold"/>
-                                        <p:tgtEl>
-                                          <p:spTgt spid="9"/>
-                                        </p:tgtEl>
-                                        <p:attrNameLst>
-                                          <p:attrName>ppt_h</p:attrName>
-                                        </p:attrNameLst>
-                                      </p:cBhvr>
-                                      <p:tavLst>
-                                        <p:tav tm="0">
-                                          <p:val>
-                                            <p:fltVal val="0"/>
-                                          </p:val>
-                                        </p:tav>
-                                        <p:tav tm="100000">
-                                          <p:val>
-                                            <p:strVal val="#ppt_h"/>
-                                          </p:val>
-                                        </p:tav>
-                                      </p:tavLst>
-                                    </p:anim>
-                                    <p:animEffect transition="in" filter="fade">
-                                      <p:cBhvr>
-                                        <p:cTn id="9" dur="500"/>
-                                        <p:tgtEl>
-                                          <p:spTgt spid="9"/>
-                                        </p:tgtEl>
-                                      </p:cBhvr>
-                                    </p:animEffect>
-                                  </p:childTnLst>
-                                </p:cTn>
-                              </p:par>
-                            </p:childTnLst>
-                          </p:cTn>
-                        </p:par>
-                      </p:childTnLst>
-                    </p:cTn>
-                  </p:par>
-                  <p:par>
-                    <p:cTn id="10" fill="hold">
-                      <p:stCondLst>
-                        <p:cond delay="indefinite"/>
-                      </p:stCondLst>
-                      <p:childTnLst>
-                        <p:par>
-                          <p:cTn id="11" fill="hold">
-                            <p:stCondLst>
-                              <p:cond delay="0"/>
-                            </p:stCondLst>
-                            <p:childTnLst>
-                              <p:par>
-                                <p:cTn id="12" presetID="12" presetClass="entr" presetSubtype="8" fill="hold" grpId="0" nodeType="clickEffect">
-                                  <p:stCondLst>
-                                    <p:cond delay="0"/>
-                                  </p:stCondLst>
-                                  <p:childTnLst>
-                                    <p:set>
-                                      <p:cBhvr>
-                                        <p:cTn id="13" dur="1" fill="hold">
-                                          <p:stCondLst>
-                                            <p:cond delay="0"/>
-                                          </p:stCondLst>
-                                        </p:cTn>
-                                        <p:tgtEl>
-                                          <p:spTgt spid="4"/>
-                                        </p:tgtEl>
-                                        <p:attrNameLst>
-                                          <p:attrName>style.visibility</p:attrName>
-                                        </p:attrNameLst>
-                                      </p:cBhvr>
-                                      <p:to>
-                                        <p:strVal val="visible"/>
-                                      </p:to>
-                                    </p:set>
-                                    <p:anim calcmode="lin" valueType="num">
-                                      <p:cBhvr additive="base">
-                                        <p:cTn id="14" dur="500"/>
-                                        <p:tgtEl>
-                                          <p:spTgt spid="4"/>
-                                        </p:tgtEl>
-                                        <p:attrNameLst>
-                                          <p:attrName>ppt_x</p:attrName>
-                                        </p:attrNameLst>
-                                      </p:cBhvr>
-                                      <p:tavLst>
-                                        <p:tav tm="0">
-                                          <p:val>
-                                            <p:strVal val="#ppt_x-#ppt_w*1.125000"/>
-                                          </p:val>
-                                        </p:tav>
-                                        <p:tav tm="100000">
-                                          <p:val>
-                                            <p:strVal val="#ppt_x"/>
-                                          </p:val>
-                                        </p:tav>
-                                      </p:tavLst>
-                                    </p:anim>
-                                    <p:animEffect transition="in" filter="wipe(right)">
-                                      <p:cBhvr>
-                                        <p:cTn id="15" dur="500"/>
-                                        <p:tgtEl>
-                                          <p:spTgt spid="4"/>
-                                        </p:tgtEl>
-                                      </p:cBhvr>
-                                    </p:animEffect>
-                                  </p:childTnLst>
-                                </p:cTn>
-                              </p:par>
-                            </p:childTnLst>
-                          </p:cTn>
-                        </p:par>
-                      </p:childTnLst>
-                    </p:cTn>
-                  </p:par>
-                  <p:par>
-                    <p:cTn id="16" fill="hold">
-                      <p:stCondLst>
-                        <p:cond delay="indefinite"/>
-                      </p:stCondLst>
-                      <p:childTnLst>
-                        <p:par>
-                          <p:cTn id="17" fill="hold">
-                            <p:stCondLst>
-                              <p:cond delay="0"/>
-                            </p:stCondLst>
-                            <p:childTnLst>
-                              <p:par>
-                                <p:cTn id="18" presetID="52" presetClass="exit" presetSubtype="0" fill="hold" nodeType="clickEffect">
-                                  <p:stCondLst>
-                                    <p:cond delay="0"/>
-                                  </p:stCondLst>
-                                  <p:childTnLst>
-                                    <p:animScale>
-                                      <p:cBhvr>
-                                        <p:cTn id="19" dur="1000" accel="50000">
-                                          <p:stCondLst>
-                                            <p:cond delay="0"/>
-                                          </p:stCondLst>
-                                        </p:cTn>
-                                        <p:tgtEl>
-                                          <p:spTgt spid="9"/>
-                                        </p:tgtEl>
-                                      </p:cBhvr>
-                                      <p:from x="100000" y="100000"/>
-                                      <p:to x="250000" y="250000"/>
-                                    </p:animScale>
-                                    <p:animMotion origin="layout" path="M 0.0000 0.0000 C 0.03802 0.0 0.1441 0.02341 0.1826 0.0915 C 0.22118 0.15964 0.24705 0.31256 0.2318 0.4083 C 0.21649 0.50394 0.20747 0.57948 0.0908 0.6661 C -0.02552 0.75279 -0.37517 0.88508 -0.4674 0.9289" pathEditMode="relative" ptsTypes="">
-                                      <p:cBhvr>
-                                        <p:cTn id="20" dur="1000" accel="50000">
-                                          <p:stCondLst>
-                                            <p:cond delay="0"/>
-                                          </p:stCondLst>
-                                        </p:cTn>
-                                        <p:tgtEl>
-                                          <p:spTgt spid="9"/>
-                                        </p:tgtEl>
-                                        <p:attrNameLst>
-                                          <p:attrName>ppt_x</p:attrName>
-                                          <p:attrName>ppt_y</p:attrName>
-                                        </p:attrNameLst>
-                                      </p:cBhvr>
-                                    </p:animMotion>
-                                    <p:animEffect transition="out" filter="fade">
-                                      <p:cBhvr>
-                                        <p:cTn id="21" dur="1000"/>
-                                        <p:tgtEl>
-                                          <p:spTgt spid="9"/>
-                                        </p:tgtEl>
-                                      </p:cBhvr>
-                                    </p:animEffect>
-                                    <p:set>
-                                      <p:cBhvr>
-                                        <p:cTn id="22" dur="1" fill="hold">
-                                          <p:stCondLst>
-                                            <p:cond delay="999"/>
-                                          </p:stCondLst>
-                                        </p:cTn>
-                                        <p:tgtEl>
-                                          <p:spTgt spid="9"/>
-                                        </p:tgtEl>
-                                        <p:attrNameLst>
-                                          <p:attrName>style.visibility</p:attrName>
-                                        </p:attrNameLst>
-                                      </p:cBhvr>
-                                      <p:to>
-                                        <p:strVal val="hidden"/>
-                                      </p:to>
-                                    </p:set>
-                                  </p:childTnLst>
-                                </p:cTn>
-                              </p:par>
-                              <p:par>
-                                <p:cTn id="23" presetID="52" presetClass="exit" presetSubtype="0" fill="hold" grpId="1" nodeType="withEffect">
-                                  <p:stCondLst>
-                                    <p:cond delay="0"/>
-                                  </p:stCondLst>
-                                  <p:childTnLst>
-                                    <p:animScale>
-                                      <p:cBhvr>
-                                        <p:cTn id="24" dur="1000" accel="50000">
-                                          <p:stCondLst>
-                                            <p:cond delay="0"/>
-                                          </p:stCondLst>
-                                        </p:cTn>
-                                        <p:tgtEl>
-                                          <p:spTgt spid="4"/>
-                                        </p:tgtEl>
-                                      </p:cBhvr>
-                                      <p:from x="100000" y="100000"/>
-                                      <p:to x="250000" y="250000"/>
-                                    </p:animScale>
-                                    <p:animMotion origin="layout" path="M 0.0000 0.0000 C 0.03802 0.0 0.1441 0.02341 0.1826 0.0915 C 0.22118 0.15964 0.24705 0.31256 0.2318 0.4083 C 0.21649 0.50394 0.20747 0.57948 0.0908 0.6661 C -0.02552 0.75279 -0.37517 0.88508 -0.4674 0.9289" pathEditMode="relative" ptsTypes="">
-                                      <p:cBhvr>
-                                        <p:cTn id="25" dur="1000" accel="50000">
-                                          <p:stCondLst>
-                                            <p:cond delay="0"/>
-                                          </p:stCondLst>
-                                        </p:cTn>
-                                        <p:tgtEl>
-                                          <p:spTgt spid="4"/>
-                                        </p:tgtEl>
-                                        <p:attrNameLst>
-                                          <p:attrName>ppt_x</p:attrName>
-                                          <p:attrName>ppt_y</p:attrName>
-                                        </p:attrNameLst>
-                                      </p:cBhvr>
-                                    </p:animMotion>
-                                    <p:animEffect transition="out" filter="fade">
-                                      <p:cBhvr>
-                                        <p:cTn id="26" dur="1000"/>
-                                        <p:tgtEl>
-                                          <p:spTgt spid="4"/>
-                                        </p:tgtEl>
-                                      </p:cBhvr>
-                                    </p:animEffect>
-                                    <p:set>
-                                      <p:cBhvr>
-                                        <p:cTn id="27" dur="1" fill="hold">
-                                          <p:stCondLst>
-                                            <p:cond delay="999"/>
-                                          </p:stCondLst>
-                                        </p:cTn>
-                                        <p:tgtEl>
-                                          <p:spTgt spid="4"/>
-                                        </p:tgtEl>
-                                        <p:attrNameLst>
-                                          <p:attrName>style.visibility</p:attrName>
-                                        </p:attrNameLst>
-                                      </p:cBhvr>
-                                      <p:to>
-                                        <p:strVal val="hidden"/>
-                                      </p:to>
-                                    </p:set>
-                                  </p:childTnLst>
-                                </p:cTn>
-                              </p:par>
-                            </p:childTnLst>
-                          </p:cTn>
-                        </p:par>
-                      </p:childTnLst>
-                    </p:cTn>
-                  </p:par>
-                </p:childTnLst>
-              </p:cTn>
-              <p:prevCondLst>
-                <p:cond evt="onPrev" delay="0">
-                  <p:tgtEl>
-                    <p:sldTgt/>
-                  </p:tgtEl>
-                </p:cond>
-              </p:prevCondLst>
-              <p:nextCondLst>
-                <p:cond evt="onNext" delay="0">
-                  <p:tgtEl>
-                    <p:sldTgt/>
-                  </p:tgtEl>
-                </p:cond>
-              </p:nextCondLst>
-            </p:seq>
-          </p:childTnLst>
-        </p:cTn>
+        <p:cTn id="1" dur="indefinite" restart="never" nodeType="tmRoot"/>
       </p:par>
     </p:tnLst>
-    <p:bldLst>
-      <p:bldP spid="4" grpId="0"/>
-      <p:bldP spid="4" grpId="1"/>
-    </p:bldLst>
   </p:timing>
 </p:sld>
 </file>
@@ -6182,6 +4788,34 @@
           <a:chExt cx="0" cy="0"/>
         </a:xfrm>
       </p:grpSpPr>
+      <p:sp>
+        <p:nvSpPr>
+          <p:cNvPr id="2" name="Footer Placeholder 1"/>
+          <p:cNvSpPr>
+            <a:spLocks noGrp="1"/>
+          </p:cNvSpPr>
+          <p:nvPr>
+            <p:ph type="ftr" sz="quarter" idx="11"/>
+          </p:nvPr>
+        </p:nvSpPr>
+        <p:spPr>
+          <a:xfrm>
+            <a:off x="0" y="6355443"/>
+            <a:ext cx="4114800" cy="365125"/>
+          </a:xfrm>
+        </p:spPr>
+        <p:txBody>
+          <a:bodyPr/>
+          <a:lstStyle/>
+          <a:p>
+            <a:r>
+              <a:rPr lang="en-US" dirty="0" smtClean="0"/>
+              <a:t>16 March, 2025</a:t>
+            </a:r>
+            <a:endParaRPr lang="en-US" dirty="0"/>
+          </a:p>
+        </p:txBody>
+      </p:sp>
       <p:sp>
         <p:nvSpPr>
           <p:cNvPr id="3" name="Slide Number Placeholder 2"/>
@@ -6398,370 +5032,12 @@
   <p:clrMapOvr>
     <a:masterClrMapping/>
   </p:clrMapOvr>
-  <mc:AlternateContent xmlns:mc="http://schemas.openxmlformats.org/markup-compatibility/2006">
-    <mc:Choice xmlns:p14="http://schemas.microsoft.com/office/powerpoint/2010/main" Requires="p14">
-      <p:transition p14:dur="0"/>
-    </mc:Choice>
-    <mc:Fallback>
-      <p:transition/>
-    </mc:Fallback>
-  </mc:AlternateContent>
   <p:timing>
     <p:tnLst>
       <p:par>
-        <p:cTn id="1" dur="indefinite" restart="never" nodeType="tmRoot">
-          <p:childTnLst>
-            <p:seq concurrent="1" nextAc="seek">
-              <p:cTn id="2" dur="indefinite" nodeType="mainSeq">
-                <p:childTnLst>
-                  <p:par>
-                    <p:cTn id="3" fill="hold">
-                      <p:stCondLst>
-                        <p:cond delay="indefinite"/>
-                      </p:stCondLst>
-                      <p:childTnLst>
-                        <p:par>
-                          <p:cTn id="4" fill="hold">
-                            <p:stCondLst>
-                              <p:cond delay="0"/>
-                            </p:stCondLst>
-                            <p:childTnLst>
-                              <p:par>
-                                <p:cTn id="5" presetID="53" presetClass="entr" presetSubtype="16" fill="hold" nodeType="clickEffect">
-                                  <p:stCondLst>
-                                    <p:cond delay="0"/>
-                                  </p:stCondLst>
-                                  <p:childTnLst>
-                                    <p:set>
-                                      <p:cBhvr>
-                                        <p:cTn id="6" dur="1" fill="hold">
-                                          <p:stCondLst>
-                                            <p:cond delay="0"/>
-                                          </p:stCondLst>
-                                        </p:cTn>
-                                        <p:tgtEl>
-                                          <p:spTgt spid="6"/>
-                                        </p:tgtEl>
-                                        <p:attrNameLst>
-                                          <p:attrName>style.visibility</p:attrName>
-                                        </p:attrNameLst>
-                                      </p:cBhvr>
-                                      <p:to>
-                                        <p:strVal val="visible"/>
-                                      </p:to>
-                                    </p:set>
-                                    <p:anim calcmode="lin" valueType="num">
-                                      <p:cBhvr>
-                                        <p:cTn id="7" dur="500" fill="hold"/>
-                                        <p:tgtEl>
-                                          <p:spTgt spid="6"/>
-                                        </p:tgtEl>
-                                        <p:attrNameLst>
-                                          <p:attrName>ppt_w</p:attrName>
-                                        </p:attrNameLst>
-                                      </p:cBhvr>
-                                      <p:tavLst>
-                                        <p:tav tm="0">
-                                          <p:val>
-                                            <p:fltVal val="0"/>
-                                          </p:val>
-                                        </p:tav>
-                                        <p:tav tm="100000">
-                                          <p:val>
-                                            <p:strVal val="#ppt_w"/>
-                                          </p:val>
-                                        </p:tav>
-                                      </p:tavLst>
-                                    </p:anim>
-                                    <p:anim calcmode="lin" valueType="num">
-                                      <p:cBhvr>
-                                        <p:cTn id="8" dur="500" fill="hold"/>
-                                        <p:tgtEl>
-                                          <p:spTgt spid="6"/>
-                                        </p:tgtEl>
-                                        <p:attrNameLst>
-                                          <p:attrName>ppt_h</p:attrName>
-                                        </p:attrNameLst>
-                                      </p:cBhvr>
-                                      <p:tavLst>
-                                        <p:tav tm="0">
-                                          <p:val>
-                                            <p:fltVal val="0"/>
-                                          </p:val>
-                                        </p:tav>
-                                        <p:tav tm="100000">
-                                          <p:val>
-                                            <p:strVal val="#ppt_h"/>
-                                          </p:val>
-                                        </p:tav>
-                                      </p:tavLst>
-                                    </p:anim>
-                                    <p:animEffect transition="in" filter="fade">
-                                      <p:cBhvr>
-                                        <p:cTn id="9" dur="500"/>
-                                        <p:tgtEl>
-                                          <p:spTgt spid="6"/>
-                                        </p:tgtEl>
-                                      </p:cBhvr>
-                                    </p:animEffect>
-                                  </p:childTnLst>
-                                </p:cTn>
-                              </p:par>
-                            </p:childTnLst>
-                          </p:cTn>
-                        </p:par>
-                      </p:childTnLst>
-                    </p:cTn>
-                  </p:par>
-                  <p:par>
-                    <p:cTn id="10" fill="hold">
-                      <p:stCondLst>
-                        <p:cond delay="indefinite"/>
-                      </p:stCondLst>
-                      <p:childTnLst>
-                        <p:par>
-                          <p:cTn id="11" fill="hold">
-                            <p:stCondLst>
-                              <p:cond delay="0"/>
-                            </p:stCondLst>
-                            <p:childTnLst>
-                              <p:par>
-                                <p:cTn id="12" presetID="12" presetClass="entr" presetSubtype="1" fill="hold" grpId="0" nodeType="clickEffect">
-                                  <p:stCondLst>
-                                    <p:cond delay="0"/>
-                                  </p:stCondLst>
-                                  <p:childTnLst>
-                                    <p:set>
-                                      <p:cBhvr>
-                                        <p:cTn id="13" dur="1" fill="hold">
-                                          <p:stCondLst>
-                                            <p:cond delay="0"/>
-                                          </p:stCondLst>
-                                        </p:cTn>
-                                        <p:tgtEl>
-                                          <p:spTgt spid="4"/>
-                                        </p:tgtEl>
-                                        <p:attrNameLst>
-                                          <p:attrName>style.visibility</p:attrName>
-                                        </p:attrNameLst>
-                                      </p:cBhvr>
-                                      <p:to>
-                                        <p:strVal val="visible"/>
-                                      </p:to>
-                                    </p:set>
-                                    <p:anim calcmode="lin" valueType="num">
-                                      <p:cBhvr additive="base">
-                                        <p:cTn id="14" dur="500"/>
-                                        <p:tgtEl>
-                                          <p:spTgt spid="4"/>
-                                        </p:tgtEl>
-                                        <p:attrNameLst>
-                                          <p:attrName>ppt_y</p:attrName>
-                                        </p:attrNameLst>
-                                      </p:cBhvr>
-                                      <p:tavLst>
-                                        <p:tav tm="0">
-                                          <p:val>
-                                            <p:strVal val="#ppt_y-#ppt_h*1.125000"/>
-                                          </p:val>
-                                        </p:tav>
-                                        <p:tav tm="100000">
-                                          <p:val>
-                                            <p:strVal val="#ppt_y"/>
-                                          </p:val>
-                                        </p:tav>
-                                      </p:tavLst>
-                                    </p:anim>
-                                    <p:animEffect transition="in" filter="wipe(down)">
-                                      <p:cBhvr>
-                                        <p:cTn id="15" dur="500"/>
-                                        <p:tgtEl>
-                                          <p:spTgt spid="4"/>
-                                        </p:tgtEl>
-                                      </p:cBhvr>
-                                    </p:animEffect>
-                                  </p:childTnLst>
-                                </p:cTn>
-                              </p:par>
-                            </p:childTnLst>
-                          </p:cTn>
-                        </p:par>
-                      </p:childTnLst>
-                    </p:cTn>
-                  </p:par>
-                  <p:par>
-                    <p:cTn id="16" fill="hold">
-                      <p:stCondLst>
-                        <p:cond delay="indefinite"/>
-                      </p:stCondLst>
-                      <p:childTnLst>
-                        <p:par>
-                          <p:cTn id="17" fill="hold">
-                            <p:stCondLst>
-                              <p:cond delay="0"/>
-                            </p:stCondLst>
-                            <p:childTnLst>
-                              <p:par>
-                                <p:cTn id="18" presetID="52" presetClass="exit" presetSubtype="0" fill="hold" nodeType="clickEffect">
-                                  <p:stCondLst>
-                                    <p:cond delay="0"/>
-                                  </p:stCondLst>
-                                  <p:childTnLst>
-                                    <p:animScale>
-                                      <p:cBhvr>
-                                        <p:cTn id="19" dur="1000" accel="50000">
-                                          <p:stCondLst>
-                                            <p:cond delay="0"/>
-                                          </p:stCondLst>
-                                        </p:cTn>
-                                        <p:tgtEl>
-                                          <p:spTgt spid="6"/>
-                                        </p:tgtEl>
-                                      </p:cBhvr>
-                                      <p:from x="100000" y="100000"/>
-                                      <p:to x="250000" y="250000"/>
-                                    </p:animScale>
-                                    <p:animMotion origin="layout" path="M 0.0000 0.0000 C 0.03802 0.0 0.1441 0.02341 0.1826 0.0915 C 0.22118 0.15964 0.24705 0.31256 0.2318 0.4083 C 0.21649 0.50394 0.20747 0.57948 0.0908 0.6661 C -0.02552 0.75279 -0.37517 0.88508 -0.4674 0.9289" pathEditMode="relative" ptsTypes="">
-                                      <p:cBhvr>
-                                        <p:cTn id="20" dur="1000" accel="50000">
-                                          <p:stCondLst>
-                                            <p:cond delay="0"/>
-                                          </p:stCondLst>
-                                        </p:cTn>
-                                        <p:tgtEl>
-                                          <p:spTgt spid="6"/>
-                                        </p:tgtEl>
-                                        <p:attrNameLst>
-                                          <p:attrName>ppt_x</p:attrName>
-                                          <p:attrName>ppt_y</p:attrName>
-                                        </p:attrNameLst>
-                                      </p:cBhvr>
-                                    </p:animMotion>
-                                    <p:animEffect transition="out" filter="fade">
-                                      <p:cBhvr>
-                                        <p:cTn id="21" dur="1000"/>
-                                        <p:tgtEl>
-                                          <p:spTgt spid="6"/>
-                                        </p:tgtEl>
-                                      </p:cBhvr>
-                                    </p:animEffect>
-                                    <p:set>
-                                      <p:cBhvr>
-                                        <p:cTn id="22" dur="1" fill="hold">
-                                          <p:stCondLst>
-                                            <p:cond delay="999"/>
-                                          </p:stCondLst>
-                                        </p:cTn>
-                                        <p:tgtEl>
-                                          <p:spTgt spid="6"/>
-                                        </p:tgtEl>
-                                        <p:attrNameLst>
-                                          <p:attrName>style.visibility</p:attrName>
-                                        </p:attrNameLst>
-                                      </p:cBhvr>
-                                      <p:to>
-                                        <p:strVal val="hidden"/>
-                                      </p:to>
-                                    </p:set>
-                                  </p:childTnLst>
-                                </p:cTn>
-                              </p:par>
-                              <p:par>
-                                <p:cTn id="23" presetID="52" presetClass="exit" presetSubtype="0" fill="hold" grpId="1" nodeType="withEffect">
-                                  <p:stCondLst>
-                                    <p:cond delay="0"/>
-                                  </p:stCondLst>
-                                  <p:childTnLst>
-                                    <p:animScale>
-                                      <p:cBhvr>
-                                        <p:cTn id="24" dur="1000" accel="50000">
-                                          <p:stCondLst>
-                                            <p:cond delay="0"/>
-                                          </p:stCondLst>
-                                        </p:cTn>
-                                        <p:tgtEl>
-                                          <p:spTgt spid="4"/>
-                                        </p:tgtEl>
-                                      </p:cBhvr>
-                                      <p:from x="100000" y="100000"/>
-                                      <p:to x="250000" y="250000"/>
-                                    </p:animScale>
-                                    <p:animMotion origin="layout" path="M 0.0000 0.0000 C 0.03802 0.0 0.1441 0.02341 0.1826 0.0915 C 0.22118 0.15964 0.24705 0.31256 0.2318 0.4083 C 0.21649 0.50394 0.20747 0.57948 0.0908 0.6661 C -0.02552 0.75279 -0.37517 0.88508 -0.4674 0.9289" pathEditMode="relative" ptsTypes="">
-                                      <p:cBhvr>
-                                        <p:cTn id="25" dur="1000" accel="50000">
-                                          <p:stCondLst>
-                                            <p:cond delay="0"/>
-                                          </p:stCondLst>
-                                        </p:cTn>
-                                        <p:tgtEl>
-                                          <p:spTgt spid="4"/>
-                                        </p:tgtEl>
-                                        <p:attrNameLst>
-                                          <p:attrName>ppt_x</p:attrName>
-                                          <p:attrName>ppt_y</p:attrName>
-                                        </p:attrNameLst>
-                                      </p:cBhvr>
-                                    </p:animMotion>
-                                    <p:animEffect transition="out" filter="fade">
-                                      <p:cBhvr>
-                                        <p:cTn id="26" dur="1000"/>
-                                        <p:tgtEl>
-                                          <p:spTgt spid="4"/>
-                                        </p:tgtEl>
-                                      </p:cBhvr>
-                                    </p:animEffect>
-                                    <p:set>
-                                      <p:cBhvr>
-                                        <p:cTn id="27" dur="1" fill="hold">
-                                          <p:stCondLst>
-                                            <p:cond delay="999"/>
-                                          </p:stCondLst>
-                                        </p:cTn>
-                                        <p:tgtEl>
-                                          <p:spTgt spid="4"/>
-                                        </p:tgtEl>
-                                        <p:attrNameLst>
-                                          <p:attrName>style.visibility</p:attrName>
-                                        </p:attrNameLst>
-                                      </p:cBhvr>
-                                      <p:to>
-                                        <p:strVal val="hidden"/>
-                                      </p:to>
-                                    </p:set>
-                                  </p:childTnLst>
-                                </p:cTn>
-                              </p:par>
-                            </p:childTnLst>
-                          </p:cTn>
-                        </p:par>
-                      </p:childTnLst>
-                    </p:cTn>
-                  </p:par>
-                </p:childTnLst>
-              </p:cTn>
-              <p:prevCondLst>
-                <p:cond evt="onPrev" delay="0">
-                  <p:tgtEl>
-                    <p:sldTgt/>
-                  </p:tgtEl>
-                </p:cond>
-              </p:prevCondLst>
-              <p:nextCondLst>
-                <p:cond evt="onNext" delay="0">
-                  <p:tgtEl>
-                    <p:sldTgt/>
-                  </p:tgtEl>
-                </p:cond>
-              </p:nextCondLst>
-            </p:seq>
-          </p:childTnLst>
-        </p:cTn>
+        <p:cTn id="1" dur="indefinite" restart="never" nodeType="tmRoot"/>
       </p:par>
     </p:tnLst>
-    <p:bldLst>
-      <p:bldP spid="4" grpId="0"/>
-      <p:bldP spid="4" grpId="1"/>
-    </p:bldLst>
   </p:timing>
 </p:sld>
 </file>
@@ -6783,6 +5059,34 @@
           <a:chExt cx="0" cy="0"/>
         </a:xfrm>
       </p:grpSpPr>
+      <p:sp>
+        <p:nvSpPr>
+          <p:cNvPr id="2" name="Footer Placeholder 1"/>
+          <p:cNvSpPr>
+            <a:spLocks noGrp="1"/>
+          </p:cNvSpPr>
+          <p:nvPr>
+            <p:ph type="ftr" sz="quarter" idx="11"/>
+          </p:nvPr>
+        </p:nvSpPr>
+        <p:spPr>
+          <a:xfrm>
+            <a:off x="0" y="6356350"/>
+            <a:ext cx="4114800" cy="365125"/>
+          </a:xfrm>
+        </p:spPr>
+        <p:txBody>
+          <a:bodyPr/>
+          <a:lstStyle/>
+          <a:p>
+            <a:r>
+              <a:rPr lang="en-US" dirty="0" smtClean="0"/>
+              <a:t>16 March, 2025</a:t>
+            </a:r>
+            <a:endParaRPr lang="en-US" dirty="0"/>
+          </a:p>
+        </p:txBody>
+      </p:sp>
       <p:sp>
         <p:nvSpPr>
           <p:cNvPr id="3" name="Slide Number Placeholder 2"/>
@@ -7000,370 +5304,12 @@
   <p:clrMapOvr>
     <a:masterClrMapping/>
   </p:clrMapOvr>
-  <mc:AlternateContent xmlns:mc="http://schemas.openxmlformats.org/markup-compatibility/2006">
-    <mc:Choice xmlns:p14="http://schemas.microsoft.com/office/powerpoint/2010/main" Requires="p14">
-      <p:transition p14:dur="0"/>
-    </mc:Choice>
-    <mc:Fallback>
-      <p:transition/>
-    </mc:Fallback>
-  </mc:AlternateContent>
   <p:timing>
     <p:tnLst>
       <p:par>
-        <p:cTn id="1" dur="indefinite" restart="never" nodeType="tmRoot">
-          <p:childTnLst>
-            <p:seq concurrent="1" nextAc="seek">
-              <p:cTn id="2" dur="indefinite" nodeType="mainSeq">
-                <p:childTnLst>
-                  <p:par>
-                    <p:cTn id="3" fill="hold">
-                      <p:stCondLst>
-                        <p:cond delay="indefinite"/>
-                      </p:stCondLst>
-                      <p:childTnLst>
-                        <p:par>
-                          <p:cTn id="4" fill="hold">
-                            <p:stCondLst>
-                              <p:cond delay="0"/>
-                            </p:stCondLst>
-                            <p:childTnLst>
-                              <p:par>
-                                <p:cTn id="5" presetID="53" presetClass="entr" presetSubtype="16" fill="hold" nodeType="clickEffect">
-                                  <p:stCondLst>
-                                    <p:cond delay="0"/>
-                                  </p:stCondLst>
-                                  <p:childTnLst>
-                                    <p:set>
-                                      <p:cBhvr>
-                                        <p:cTn id="6" dur="1" fill="hold">
-                                          <p:stCondLst>
-                                            <p:cond delay="0"/>
-                                          </p:stCondLst>
-                                        </p:cTn>
-                                        <p:tgtEl>
-                                          <p:spTgt spid="6"/>
-                                        </p:tgtEl>
-                                        <p:attrNameLst>
-                                          <p:attrName>style.visibility</p:attrName>
-                                        </p:attrNameLst>
-                                      </p:cBhvr>
-                                      <p:to>
-                                        <p:strVal val="visible"/>
-                                      </p:to>
-                                    </p:set>
-                                    <p:anim calcmode="lin" valueType="num">
-                                      <p:cBhvr>
-                                        <p:cTn id="7" dur="500" fill="hold"/>
-                                        <p:tgtEl>
-                                          <p:spTgt spid="6"/>
-                                        </p:tgtEl>
-                                        <p:attrNameLst>
-                                          <p:attrName>ppt_w</p:attrName>
-                                        </p:attrNameLst>
-                                      </p:cBhvr>
-                                      <p:tavLst>
-                                        <p:tav tm="0">
-                                          <p:val>
-                                            <p:fltVal val="0"/>
-                                          </p:val>
-                                        </p:tav>
-                                        <p:tav tm="100000">
-                                          <p:val>
-                                            <p:strVal val="#ppt_w"/>
-                                          </p:val>
-                                        </p:tav>
-                                      </p:tavLst>
-                                    </p:anim>
-                                    <p:anim calcmode="lin" valueType="num">
-                                      <p:cBhvr>
-                                        <p:cTn id="8" dur="500" fill="hold"/>
-                                        <p:tgtEl>
-                                          <p:spTgt spid="6"/>
-                                        </p:tgtEl>
-                                        <p:attrNameLst>
-                                          <p:attrName>ppt_h</p:attrName>
-                                        </p:attrNameLst>
-                                      </p:cBhvr>
-                                      <p:tavLst>
-                                        <p:tav tm="0">
-                                          <p:val>
-                                            <p:fltVal val="0"/>
-                                          </p:val>
-                                        </p:tav>
-                                        <p:tav tm="100000">
-                                          <p:val>
-                                            <p:strVal val="#ppt_h"/>
-                                          </p:val>
-                                        </p:tav>
-                                      </p:tavLst>
-                                    </p:anim>
-                                    <p:animEffect transition="in" filter="fade">
-                                      <p:cBhvr>
-                                        <p:cTn id="9" dur="500"/>
-                                        <p:tgtEl>
-                                          <p:spTgt spid="6"/>
-                                        </p:tgtEl>
-                                      </p:cBhvr>
-                                    </p:animEffect>
-                                  </p:childTnLst>
-                                </p:cTn>
-                              </p:par>
-                            </p:childTnLst>
-                          </p:cTn>
-                        </p:par>
-                      </p:childTnLst>
-                    </p:cTn>
-                  </p:par>
-                  <p:par>
-                    <p:cTn id="10" fill="hold">
-                      <p:stCondLst>
-                        <p:cond delay="indefinite"/>
-                      </p:stCondLst>
-                      <p:childTnLst>
-                        <p:par>
-                          <p:cTn id="11" fill="hold">
-                            <p:stCondLst>
-                              <p:cond delay="0"/>
-                            </p:stCondLst>
-                            <p:childTnLst>
-                              <p:par>
-                                <p:cTn id="12" presetID="12" presetClass="entr" presetSubtype="4" fill="hold" grpId="0" nodeType="clickEffect">
-                                  <p:stCondLst>
-                                    <p:cond delay="0"/>
-                                  </p:stCondLst>
-                                  <p:childTnLst>
-                                    <p:set>
-                                      <p:cBhvr>
-                                        <p:cTn id="13" dur="1" fill="hold">
-                                          <p:stCondLst>
-                                            <p:cond delay="0"/>
-                                          </p:stCondLst>
-                                        </p:cTn>
-                                        <p:tgtEl>
-                                          <p:spTgt spid="5"/>
-                                        </p:tgtEl>
-                                        <p:attrNameLst>
-                                          <p:attrName>style.visibility</p:attrName>
-                                        </p:attrNameLst>
-                                      </p:cBhvr>
-                                      <p:to>
-                                        <p:strVal val="visible"/>
-                                      </p:to>
-                                    </p:set>
-                                    <p:anim calcmode="lin" valueType="num">
-                                      <p:cBhvr additive="base">
-                                        <p:cTn id="14" dur="500"/>
-                                        <p:tgtEl>
-                                          <p:spTgt spid="5"/>
-                                        </p:tgtEl>
-                                        <p:attrNameLst>
-                                          <p:attrName>ppt_y</p:attrName>
-                                        </p:attrNameLst>
-                                      </p:cBhvr>
-                                      <p:tavLst>
-                                        <p:tav tm="0">
-                                          <p:val>
-                                            <p:strVal val="#ppt_y+#ppt_h*1.125000"/>
-                                          </p:val>
-                                        </p:tav>
-                                        <p:tav tm="100000">
-                                          <p:val>
-                                            <p:strVal val="#ppt_y"/>
-                                          </p:val>
-                                        </p:tav>
-                                      </p:tavLst>
-                                    </p:anim>
-                                    <p:animEffect transition="in" filter="wipe(up)">
-                                      <p:cBhvr>
-                                        <p:cTn id="15" dur="500"/>
-                                        <p:tgtEl>
-                                          <p:spTgt spid="5"/>
-                                        </p:tgtEl>
-                                      </p:cBhvr>
-                                    </p:animEffect>
-                                  </p:childTnLst>
-                                </p:cTn>
-                              </p:par>
-                            </p:childTnLst>
-                          </p:cTn>
-                        </p:par>
-                      </p:childTnLst>
-                    </p:cTn>
-                  </p:par>
-                  <p:par>
-                    <p:cTn id="16" fill="hold">
-                      <p:stCondLst>
-                        <p:cond delay="indefinite"/>
-                      </p:stCondLst>
-                      <p:childTnLst>
-                        <p:par>
-                          <p:cTn id="17" fill="hold">
-                            <p:stCondLst>
-                              <p:cond delay="0"/>
-                            </p:stCondLst>
-                            <p:childTnLst>
-                              <p:par>
-                                <p:cTn id="18" presetID="52" presetClass="exit" presetSubtype="0" fill="hold" nodeType="clickEffect">
-                                  <p:stCondLst>
-                                    <p:cond delay="0"/>
-                                  </p:stCondLst>
-                                  <p:childTnLst>
-                                    <p:animScale>
-                                      <p:cBhvr>
-                                        <p:cTn id="19" dur="1000" accel="50000">
-                                          <p:stCondLst>
-                                            <p:cond delay="0"/>
-                                          </p:stCondLst>
-                                        </p:cTn>
-                                        <p:tgtEl>
-                                          <p:spTgt spid="6"/>
-                                        </p:tgtEl>
-                                      </p:cBhvr>
-                                      <p:from x="100000" y="100000"/>
-                                      <p:to x="250000" y="250000"/>
-                                    </p:animScale>
-                                    <p:animMotion origin="layout" path="M 0.0000 0.0000 C 0.03802 0.0 0.1441 0.02341 0.1826 0.0915 C 0.22118 0.15964 0.24705 0.31256 0.2318 0.4083 C 0.21649 0.50394 0.20747 0.57948 0.0908 0.6661 C -0.02552 0.75279 -0.37517 0.88508 -0.4674 0.9289" pathEditMode="relative" ptsTypes="">
-                                      <p:cBhvr>
-                                        <p:cTn id="20" dur="1000" accel="50000">
-                                          <p:stCondLst>
-                                            <p:cond delay="0"/>
-                                          </p:stCondLst>
-                                        </p:cTn>
-                                        <p:tgtEl>
-                                          <p:spTgt spid="6"/>
-                                        </p:tgtEl>
-                                        <p:attrNameLst>
-                                          <p:attrName>ppt_x</p:attrName>
-                                          <p:attrName>ppt_y</p:attrName>
-                                        </p:attrNameLst>
-                                      </p:cBhvr>
-                                    </p:animMotion>
-                                    <p:animEffect transition="out" filter="fade">
-                                      <p:cBhvr>
-                                        <p:cTn id="21" dur="1000"/>
-                                        <p:tgtEl>
-                                          <p:spTgt spid="6"/>
-                                        </p:tgtEl>
-                                      </p:cBhvr>
-                                    </p:animEffect>
-                                    <p:set>
-                                      <p:cBhvr>
-                                        <p:cTn id="22" dur="1" fill="hold">
-                                          <p:stCondLst>
-                                            <p:cond delay="999"/>
-                                          </p:stCondLst>
-                                        </p:cTn>
-                                        <p:tgtEl>
-                                          <p:spTgt spid="6"/>
-                                        </p:tgtEl>
-                                        <p:attrNameLst>
-                                          <p:attrName>style.visibility</p:attrName>
-                                        </p:attrNameLst>
-                                      </p:cBhvr>
-                                      <p:to>
-                                        <p:strVal val="hidden"/>
-                                      </p:to>
-                                    </p:set>
-                                  </p:childTnLst>
-                                </p:cTn>
-                              </p:par>
-                              <p:par>
-                                <p:cTn id="23" presetID="52" presetClass="exit" presetSubtype="0" fill="hold" grpId="1" nodeType="withEffect">
-                                  <p:stCondLst>
-                                    <p:cond delay="0"/>
-                                  </p:stCondLst>
-                                  <p:childTnLst>
-                                    <p:animScale>
-                                      <p:cBhvr>
-                                        <p:cTn id="24" dur="1000" accel="50000">
-                                          <p:stCondLst>
-                                            <p:cond delay="0"/>
-                                          </p:stCondLst>
-                                        </p:cTn>
-                                        <p:tgtEl>
-                                          <p:spTgt spid="5"/>
-                                        </p:tgtEl>
-                                      </p:cBhvr>
-                                      <p:from x="100000" y="100000"/>
-                                      <p:to x="250000" y="250000"/>
-                                    </p:animScale>
-                                    <p:animMotion origin="layout" path="M 0.0000 0.0000 C 0.03802 0.0 0.1441 0.02341 0.1826 0.0915 C 0.22118 0.15964 0.24705 0.31256 0.2318 0.4083 C 0.21649 0.50394 0.20747 0.57948 0.0908 0.6661 C -0.02552 0.75279 -0.37517 0.88508 -0.4674 0.9289" pathEditMode="relative" ptsTypes="">
-                                      <p:cBhvr>
-                                        <p:cTn id="25" dur="1000" accel="50000">
-                                          <p:stCondLst>
-                                            <p:cond delay="0"/>
-                                          </p:stCondLst>
-                                        </p:cTn>
-                                        <p:tgtEl>
-                                          <p:spTgt spid="5"/>
-                                        </p:tgtEl>
-                                        <p:attrNameLst>
-                                          <p:attrName>ppt_x</p:attrName>
-                                          <p:attrName>ppt_y</p:attrName>
-                                        </p:attrNameLst>
-                                      </p:cBhvr>
-                                    </p:animMotion>
-                                    <p:animEffect transition="out" filter="fade">
-                                      <p:cBhvr>
-                                        <p:cTn id="26" dur="1000"/>
-                                        <p:tgtEl>
-                                          <p:spTgt spid="5"/>
-                                        </p:tgtEl>
-                                      </p:cBhvr>
-                                    </p:animEffect>
-                                    <p:set>
-                                      <p:cBhvr>
-                                        <p:cTn id="27" dur="1" fill="hold">
-                                          <p:stCondLst>
-                                            <p:cond delay="999"/>
-                                          </p:stCondLst>
-                                        </p:cTn>
-                                        <p:tgtEl>
-                                          <p:spTgt spid="5"/>
-                                        </p:tgtEl>
-                                        <p:attrNameLst>
-                                          <p:attrName>style.visibility</p:attrName>
-                                        </p:attrNameLst>
-                                      </p:cBhvr>
-                                      <p:to>
-                                        <p:strVal val="hidden"/>
-                                      </p:to>
-                                    </p:set>
-                                  </p:childTnLst>
-                                </p:cTn>
-                              </p:par>
-                            </p:childTnLst>
-                          </p:cTn>
-                        </p:par>
-                      </p:childTnLst>
-                    </p:cTn>
-                  </p:par>
-                </p:childTnLst>
-              </p:cTn>
-              <p:prevCondLst>
-                <p:cond evt="onPrev" delay="0">
-                  <p:tgtEl>
-                    <p:sldTgt/>
-                  </p:tgtEl>
-                </p:cond>
-              </p:prevCondLst>
-              <p:nextCondLst>
-                <p:cond evt="onNext" delay="0">
-                  <p:tgtEl>
-                    <p:sldTgt/>
-                  </p:tgtEl>
-                </p:cond>
-              </p:nextCondLst>
-            </p:seq>
-          </p:childTnLst>
-        </p:cTn>
+        <p:cTn id="1" dur="indefinite" restart="never" nodeType="tmRoot"/>
       </p:par>
     </p:tnLst>
-    <p:bldLst>
-      <p:bldP spid="5" grpId="0"/>
-      <p:bldP spid="5" grpId="1"/>
-    </p:bldLst>
   </p:timing>
 </p:sld>
 </file>
@@ -7385,6 +5331,34 @@
           <a:chExt cx="0" cy="0"/>
         </a:xfrm>
       </p:grpSpPr>
+      <p:sp>
+        <p:nvSpPr>
+          <p:cNvPr id="2" name="Footer Placeholder 1"/>
+          <p:cNvSpPr>
+            <a:spLocks noGrp="1"/>
+          </p:cNvSpPr>
+          <p:nvPr>
+            <p:ph type="ftr" sz="quarter" idx="11"/>
+          </p:nvPr>
+        </p:nvSpPr>
+        <p:spPr>
+          <a:xfrm>
+            <a:off x="0" y="6356350"/>
+            <a:ext cx="4114800" cy="365125"/>
+          </a:xfrm>
+        </p:spPr>
+        <p:txBody>
+          <a:bodyPr/>
+          <a:lstStyle/>
+          <a:p>
+            <a:r>
+              <a:rPr lang="en-US" dirty="0" smtClean="0"/>
+              <a:t>16 March, 2025</a:t>
+            </a:r>
+            <a:endParaRPr lang="en-US" dirty="0"/>
+          </a:p>
+        </p:txBody>
+      </p:sp>
       <p:sp>
         <p:nvSpPr>
           <p:cNvPr id="3" name="Slide Number Placeholder 2"/>
@@ -7606,7 +5580,7 @@
         </p:blipFill>
         <p:spPr>
           <a:xfrm>
-            <a:off x="6370982" y="2347581"/>
+            <a:off x="5420139" y="305421"/>
             <a:ext cx="5821018" cy="2266256"/>
           </a:xfrm>
           <a:prstGeom prst="rect">
@@ -7624,370 +5598,12 @@
   <p:clrMapOvr>
     <a:masterClrMapping/>
   </p:clrMapOvr>
-  <mc:AlternateContent xmlns:mc="http://schemas.openxmlformats.org/markup-compatibility/2006">
-    <mc:Choice xmlns:p14="http://schemas.microsoft.com/office/powerpoint/2010/main" Requires="p14">
-      <p:transition p14:dur="10"/>
-    </mc:Choice>
-    <mc:Fallback>
-      <p:transition/>
-    </mc:Fallback>
-  </mc:AlternateContent>
   <p:timing>
     <p:tnLst>
       <p:par>
-        <p:cTn id="1" dur="indefinite" restart="never" nodeType="tmRoot">
-          <p:childTnLst>
-            <p:seq concurrent="1" nextAc="seek">
-              <p:cTn id="2" dur="indefinite" nodeType="mainSeq">
-                <p:childTnLst>
-                  <p:par>
-                    <p:cTn id="3" fill="hold">
-                      <p:stCondLst>
-                        <p:cond delay="indefinite"/>
-                      </p:stCondLst>
-                      <p:childTnLst>
-                        <p:par>
-                          <p:cTn id="4" fill="hold">
-                            <p:stCondLst>
-                              <p:cond delay="0"/>
-                            </p:stCondLst>
-                            <p:childTnLst>
-                              <p:par>
-                                <p:cTn id="5" presetID="53" presetClass="entr" presetSubtype="16" fill="hold" nodeType="clickEffect">
-                                  <p:stCondLst>
-                                    <p:cond delay="0"/>
-                                  </p:stCondLst>
-                                  <p:childTnLst>
-                                    <p:set>
-                                      <p:cBhvr>
-                                        <p:cTn id="6" dur="1" fill="hold">
-                                          <p:stCondLst>
-                                            <p:cond delay="0"/>
-                                          </p:stCondLst>
-                                        </p:cTn>
-                                        <p:tgtEl>
-                                          <p:spTgt spid="5"/>
-                                        </p:tgtEl>
-                                        <p:attrNameLst>
-                                          <p:attrName>style.visibility</p:attrName>
-                                        </p:attrNameLst>
-                                      </p:cBhvr>
-                                      <p:to>
-                                        <p:strVal val="visible"/>
-                                      </p:to>
-                                    </p:set>
-                                    <p:anim calcmode="lin" valueType="num">
-                                      <p:cBhvr>
-                                        <p:cTn id="7" dur="500" fill="hold"/>
-                                        <p:tgtEl>
-                                          <p:spTgt spid="5"/>
-                                        </p:tgtEl>
-                                        <p:attrNameLst>
-                                          <p:attrName>ppt_w</p:attrName>
-                                        </p:attrNameLst>
-                                      </p:cBhvr>
-                                      <p:tavLst>
-                                        <p:tav tm="0">
-                                          <p:val>
-                                            <p:fltVal val="0"/>
-                                          </p:val>
-                                        </p:tav>
-                                        <p:tav tm="100000">
-                                          <p:val>
-                                            <p:strVal val="#ppt_w"/>
-                                          </p:val>
-                                        </p:tav>
-                                      </p:tavLst>
-                                    </p:anim>
-                                    <p:anim calcmode="lin" valueType="num">
-                                      <p:cBhvr>
-                                        <p:cTn id="8" dur="500" fill="hold"/>
-                                        <p:tgtEl>
-                                          <p:spTgt spid="5"/>
-                                        </p:tgtEl>
-                                        <p:attrNameLst>
-                                          <p:attrName>ppt_h</p:attrName>
-                                        </p:attrNameLst>
-                                      </p:cBhvr>
-                                      <p:tavLst>
-                                        <p:tav tm="0">
-                                          <p:val>
-                                            <p:fltVal val="0"/>
-                                          </p:val>
-                                        </p:tav>
-                                        <p:tav tm="100000">
-                                          <p:val>
-                                            <p:strVal val="#ppt_h"/>
-                                          </p:val>
-                                        </p:tav>
-                                      </p:tavLst>
-                                    </p:anim>
-                                    <p:animEffect transition="in" filter="fade">
-                                      <p:cBhvr>
-                                        <p:cTn id="9" dur="500"/>
-                                        <p:tgtEl>
-                                          <p:spTgt spid="5"/>
-                                        </p:tgtEl>
-                                      </p:cBhvr>
-                                    </p:animEffect>
-                                  </p:childTnLst>
-                                </p:cTn>
-                              </p:par>
-                            </p:childTnLst>
-                          </p:cTn>
-                        </p:par>
-                      </p:childTnLst>
-                    </p:cTn>
-                  </p:par>
-                  <p:par>
-                    <p:cTn id="10" fill="hold">
-                      <p:stCondLst>
-                        <p:cond delay="indefinite"/>
-                      </p:stCondLst>
-                      <p:childTnLst>
-                        <p:par>
-                          <p:cTn id="11" fill="hold">
-                            <p:stCondLst>
-                              <p:cond delay="0"/>
-                            </p:stCondLst>
-                            <p:childTnLst>
-                              <p:par>
-                                <p:cTn id="12" presetID="12" presetClass="entr" presetSubtype="1" fill="hold" grpId="0" nodeType="clickEffect">
-                                  <p:stCondLst>
-                                    <p:cond delay="0"/>
-                                  </p:stCondLst>
-                                  <p:childTnLst>
-                                    <p:set>
-                                      <p:cBhvr>
-                                        <p:cTn id="13" dur="1" fill="hold">
-                                          <p:stCondLst>
-                                            <p:cond delay="0"/>
-                                          </p:stCondLst>
-                                        </p:cTn>
-                                        <p:tgtEl>
-                                          <p:spTgt spid="4"/>
-                                        </p:tgtEl>
-                                        <p:attrNameLst>
-                                          <p:attrName>style.visibility</p:attrName>
-                                        </p:attrNameLst>
-                                      </p:cBhvr>
-                                      <p:to>
-                                        <p:strVal val="visible"/>
-                                      </p:to>
-                                    </p:set>
-                                    <p:anim calcmode="lin" valueType="num">
-                                      <p:cBhvr additive="base">
-                                        <p:cTn id="14" dur="500"/>
-                                        <p:tgtEl>
-                                          <p:spTgt spid="4"/>
-                                        </p:tgtEl>
-                                        <p:attrNameLst>
-                                          <p:attrName>ppt_y</p:attrName>
-                                        </p:attrNameLst>
-                                      </p:cBhvr>
-                                      <p:tavLst>
-                                        <p:tav tm="0">
-                                          <p:val>
-                                            <p:strVal val="#ppt_y-#ppt_h*1.125000"/>
-                                          </p:val>
-                                        </p:tav>
-                                        <p:tav tm="100000">
-                                          <p:val>
-                                            <p:strVal val="#ppt_y"/>
-                                          </p:val>
-                                        </p:tav>
-                                      </p:tavLst>
-                                    </p:anim>
-                                    <p:animEffect transition="in" filter="wipe(down)">
-                                      <p:cBhvr>
-                                        <p:cTn id="15" dur="500"/>
-                                        <p:tgtEl>
-                                          <p:spTgt spid="4"/>
-                                        </p:tgtEl>
-                                      </p:cBhvr>
-                                    </p:animEffect>
-                                  </p:childTnLst>
-                                </p:cTn>
-                              </p:par>
-                            </p:childTnLst>
-                          </p:cTn>
-                        </p:par>
-                      </p:childTnLst>
-                    </p:cTn>
-                  </p:par>
-                  <p:par>
-                    <p:cTn id="16" fill="hold">
-                      <p:stCondLst>
-                        <p:cond delay="indefinite"/>
-                      </p:stCondLst>
-                      <p:childTnLst>
-                        <p:par>
-                          <p:cTn id="17" fill="hold">
-                            <p:stCondLst>
-                              <p:cond delay="0"/>
-                            </p:stCondLst>
-                            <p:childTnLst>
-                              <p:par>
-                                <p:cTn id="18" presetID="52" presetClass="exit" presetSubtype="0" fill="hold" nodeType="clickEffect">
-                                  <p:stCondLst>
-                                    <p:cond delay="0"/>
-                                  </p:stCondLst>
-                                  <p:childTnLst>
-                                    <p:animScale>
-                                      <p:cBhvr>
-                                        <p:cTn id="19" dur="1000" accel="50000">
-                                          <p:stCondLst>
-                                            <p:cond delay="0"/>
-                                          </p:stCondLst>
-                                        </p:cTn>
-                                        <p:tgtEl>
-                                          <p:spTgt spid="5"/>
-                                        </p:tgtEl>
-                                      </p:cBhvr>
-                                      <p:from x="100000" y="100000"/>
-                                      <p:to x="250000" y="250000"/>
-                                    </p:animScale>
-                                    <p:animMotion origin="layout" path="M 0.0000 0.0000 C 0.03802 0.0 0.1441 0.02341 0.1826 0.0915 C 0.22118 0.15964 0.24705 0.31256 0.2318 0.4083 C 0.21649 0.50394 0.20747 0.57948 0.0908 0.6661 C -0.02552 0.75279 -0.37517 0.88508 -0.4674 0.9289" pathEditMode="relative" ptsTypes="">
-                                      <p:cBhvr>
-                                        <p:cTn id="20" dur="1000" accel="50000">
-                                          <p:stCondLst>
-                                            <p:cond delay="0"/>
-                                          </p:stCondLst>
-                                        </p:cTn>
-                                        <p:tgtEl>
-                                          <p:spTgt spid="5"/>
-                                        </p:tgtEl>
-                                        <p:attrNameLst>
-                                          <p:attrName>ppt_x</p:attrName>
-                                          <p:attrName>ppt_y</p:attrName>
-                                        </p:attrNameLst>
-                                      </p:cBhvr>
-                                    </p:animMotion>
-                                    <p:animEffect transition="out" filter="fade">
-                                      <p:cBhvr>
-                                        <p:cTn id="21" dur="1000"/>
-                                        <p:tgtEl>
-                                          <p:spTgt spid="5"/>
-                                        </p:tgtEl>
-                                      </p:cBhvr>
-                                    </p:animEffect>
-                                    <p:set>
-                                      <p:cBhvr>
-                                        <p:cTn id="22" dur="1" fill="hold">
-                                          <p:stCondLst>
-                                            <p:cond delay="999"/>
-                                          </p:stCondLst>
-                                        </p:cTn>
-                                        <p:tgtEl>
-                                          <p:spTgt spid="5"/>
-                                        </p:tgtEl>
-                                        <p:attrNameLst>
-                                          <p:attrName>style.visibility</p:attrName>
-                                        </p:attrNameLst>
-                                      </p:cBhvr>
-                                      <p:to>
-                                        <p:strVal val="hidden"/>
-                                      </p:to>
-                                    </p:set>
-                                  </p:childTnLst>
-                                </p:cTn>
-                              </p:par>
-                              <p:par>
-                                <p:cTn id="23" presetID="52" presetClass="exit" presetSubtype="0" fill="hold" grpId="1" nodeType="withEffect">
-                                  <p:stCondLst>
-                                    <p:cond delay="0"/>
-                                  </p:stCondLst>
-                                  <p:childTnLst>
-                                    <p:animScale>
-                                      <p:cBhvr>
-                                        <p:cTn id="24" dur="1000" accel="50000">
-                                          <p:stCondLst>
-                                            <p:cond delay="0"/>
-                                          </p:stCondLst>
-                                        </p:cTn>
-                                        <p:tgtEl>
-                                          <p:spTgt spid="4"/>
-                                        </p:tgtEl>
-                                      </p:cBhvr>
-                                      <p:from x="100000" y="100000"/>
-                                      <p:to x="250000" y="250000"/>
-                                    </p:animScale>
-                                    <p:animMotion origin="layout" path="M 0.0000 0.0000 C 0.03802 0.0 0.1441 0.02341 0.1826 0.0915 C 0.22118 0.15964 0.24705 0.31256 0.2318 0.4083 C 0.21649 0.50394 0.20747 0.57948 0.0908 0.6661 C -0.02552 0.75279 -0.37517 0.88508 -0.4674 0.9289" pathEditMode="relative" ptsTypes="">
-                                      <p:cBhvr>
-                                        <p:cTn id="25" dur="1000" accel="50000">
-                                          <p:stCondLst>
-                                            <p:cond delay="0"/>
-                                          </p:stCondLst>
-                                        </p:cTn>
-                                        <p:tgtEl>
-                                          <p:spTgt spid="4"/>
-                                        </p:tgtEl>
-                                        <p:attrNameLst>
-                                          <p:attrName>ppt_x</p:attrName>
-                                          <p:attrName>ppt_y</p:attrName>
-                                        </p:attrNameLst>
-                                      </p:cBhvr>
-                                    </p:animMotion>
-                                    <p:animEffect transition="out" filter="fade">
-                                      <p:cBhvr>
-                                        <p:cTn id="26" dur="1000"/>
-                                        <p:tgtEl>
-                                          <p:spTgt spid="4"/>
-                                        </p:tgtEl>
-                                      </p:cBhvr>
-                                    </p:animEffect>
-                                    <p:set>
-                                      <p:cBhvr>
-                                        <p:cTn id="27" dur="1" fill="hold">
-                                          <p:stCondLst>
-                                            <p:cond delay="999"/>
-                                          </p:stCondLst>
-                                        </p:cTn>
-                                        <p:tgtEl>
-                                          <p:spTgt spid="4"/>
-                                        </p:tgtEl>
-                                        <p:attrNameLst>
-                                          <p:attrName>style.visibility</p:attrName>
-                                        </p:attrNameLst>
-                                      </p:cBhvr>
-                                      <p:to>
-                                        <p:strVal val="hidden"/>
-                                      </p:to>
-                                    </p:set>
-                                  </p:childTnLst>
-                                </p:cTn>
-                              </p:par>
-                            </p:childTnLst>
-                          </p:cTn>
-                        </p:par>
-                      </p:childTnLst>
-                    </p:cTn>
-                  </p:par>
-                </p:childTnLst>
-              </p:cTn>
-              <p:prevCondLst>
-                <p:cond evt="onPrev" delay="0">
-                  <p:tgtEl>
-                    <p:sldTgt/>
-                  </p:tgtEl>
-                </p:cond>
-              </p:prevCondLst>
-              <p:nextCondLst>
-                <p:cond evt="onNext" delay="0">
-                  <p:tgtEl>
-                    <p:sldTgt/>
-                  </p:tgtEl>
-                </p:cond>
-              </p:nextCondLst>
-            </p:seq>
-          </p:childTnLst>
-        </p:cTn>
+        <p:cTn id="1" dur="indefinite" restart="never" nodeType="tmRoot"/>
       </p:par>
     </p:tnLst>
-    <p:bldLst>
-      <p:bldP spid="4" grpId="0" uiExpand="1"/>
-      <p:bldP spid="4" grpId="1"/>
-    </p:bldLst>
   </p:timing>
 </p:sld>
 </file>
@@ -8011,6 +5627,34 @@
       </p:grpSpPr>
       <p:sp>
         <p:nvSpPr>
+          <p:cNvPr id="2" name="Footer Placeholder 1"/>
+          <p:cNvSpPr>
+            <a:spLocks noGrp="1"/>
+          </p:cNvSpPr>
+          <p:nvPr>
+            <p:ph type="ftr" sz="quarter" idx="11"/>
+          </p:nvPr>
+        </p:nvSpPr>
+        <p:spPr>
+          <a:xfrm>
+            <a:off x="0" y="6356349"/>
+            <a:ext cx="4114800" cy="365125"/>
+          </a:xfrm>
+        </p:spPr>
+        <p:txBody>
+          <a:bodyPr/>
+          <a:lstStyle/>
+          <a:p>
+            <a:r>
+              <a:rPr lang="en-US" smtClean="0"/>
+              <a:t>16 March, 2025</a:t>
+            </a:r>
+            <a:endParaRPr lang="en-US" dirty="0"/>
+          </a:p>
+        </p:txBody>
+      </p:sp>
+      <p:sp>
+        <p:nvSpPr>
           <p:cNvPr id="3" name="Slide Number Placeholder 2"/>
           <p:cNvSpPr>
             <a:spLocks noGrp="1"/>
@@ -8075,7 +5719,7 @@
             </a:endParaRPr>
           </a:p>
           <a:p>
-            <a:pPr marL="396875" indent="-396875">
+            <a:pPr marL="571500" indent="-571500">
               <a:buFont typeface="Arial" panose="020B0604020202020204" pitchFamily="34" charset="0"/>
               <a:buChar char="•"/>
             </a:pPr>
@@ -8083,17 +5727,11 @@
               <a:rPr lang="en-US" sz="2800" dirty="0" smtClean="0">
                 <a:ln w="0"/>
               </a:rPr>
-              <a:t>Menu driven console </a:t>
-            </a:r>
-            <a:r>
-              <a:rPr lang="en-US" sz="2800" dirty="0" smtClean="0">
-                <a:ln w="0"/>
-              </a:rPr>
-              <a:t>interface.</a:t>
-            </a:r>
-          </a:p>
-          <a:p>
-            <a:pPr marL="396875" indent="-396875">
+              <a:t>Menu driven console interface.</a:t>
+            </a:r>
+          </a:p>
+          <a:p>
+            <a:pPr marL="571500" indent="-571500">
               <a:buFont typeface="Arial" panose="020B0604020202020204" pitchFamily="34" charset="0"/>
               <a:buChar char="•"/>
             </a:pPr>
@@ -8102,7 +5740,7 @@
             </a:endParaRPr>
           </a:p>
           <a:p>
-            <a:pPr marL="396875" indent="-396875">
+            <a:pPr marL="571500" indent="-571500">
               <a:buFont typeface="Arial" panose="020B0604020202020204" pitchFamily="34" charset="0"/>
               <a:buChar char="•"/>
             </a:pPr>
@@ -8110,59 +5748,35 @@
               <a:rPr lang="en-US" sz="2800" dirty="0" smtClean="0">
                 <a:ln w="0"/>
               </a:rPr>
-              <a:t>Requires </a:t>
-            </a:r>
+              <a:t>Requires user inputs for operations.</a:t>
+            </a:r>
+          </a:p>
+          <a:p>
+            <a:pPr marL="571500" indent="-571500">
+              <a:buFont typeface="Arial" panose="020B0604020202020204" pitchFamily="34" charset="0"/>
+              <a:buChar char="•"/>
+            </a:pPr>
+            <a:endParaRPr lang="en-US" sz="2800" b="0" cap="none" spc="0" dirty="0" smtClean="0">
+              <a:ln w="0"/>
+              <a:solidFill>
+                <a:schemeClr val="tx1"/>
+              </a:solidFill>
+            </a:endParaRPr>
+          </a:p>
+          <a:p>
+            <a:pPr marL="571500" indent="-571500">
+              <a:buFont typeface="Arial" panose="020B0604020202020204" pitchFamily="34" charset="0"/>
+              <a:buChar char="•"/>
+            </a:pPr>
             <a:r>
               <a:rPr lang="en-US" sz="2800" dirty="0" smtClean="0">
                 <a:ln w="0"/>
               </a:rPr>
-              <a:t>user inputs for </a:t>
-            </a:r>
-            <a:r>
-              <a:rPr lang="en-US" sz="2800" dirty="0" smtClean="0">
-                <a:ln w="0"/>
-              </a:rPr>
-              <a:t>operations.</a:t>
-            </a:r>
-          </a:p>
-          <a:p>
-            <a:pPr marL="396875" indent="-396875">
-              <a:buFont typeface="Arial" panose="020B0604020202020204" pitchFamily="34" charset="0"/>
-              <a:buChar char="•"/>
-            </a:pPr>
-            <a:endParaRPr lang="en-US" sz="2800" dirty="0">
-              <a:ln w="0"/>
-            </a:endParaRPr>
-          </a:p>
-          <a:p>
-            <a:pPr marL="396875" indent="-396875">
-              <a:buFont typeface="Arial" panose="020B0604020202020204" pitchFamily="34" charset="0"/>
-              <a:buChar char="•"/>
-            </a:pPr>
-            <a:r>
-              <a:rPr lang="en-US" sz="2800" dirty="0" smtClean="0">
-                <a:ln w="0"/>
-              </a:rPr>
-              <a:t>Simple </a:t>
-            </a:r>
-            <a:r>
-              <a:rPr lang="en-US" sz="2800" dirty="0" smtClean="0">
-                <a:ln w="0"/>
-              </a:rPr>
-              <a:t>and easy to use </a:t>
-            </a:r>
-            <a:r>
-              <a:rPr lang="en-US" sz="2800" dirty="0" smtClean="0">
-                <a:ln w="0"/>
-              </a:rPr>
-              <a:t>design.</a:t>
-            </a:r>
-            <a:endParaRPr lang="en-US" sz="2800" dirty="0">
-              <a:ln w="0"/>
-            </a:endParaRPr>
-          </a:p>
-          <a:p>
-            <a:pPr marL="396875" indent="-396875">
+              <a:t>Simple and easy to use design.</a:t>
+            </a:r>
+          </a:p>
+          <a:p>
+            <a:pPr marL="571500" indent="-571500">
               <a:buFont typeface="Arial" panose="020B0604020202020204" pitchFamily="34" charset="0"/>
               <a:buChar char="•"/>
             </a:pPr>
@@ -8171,7 +5785,7 @@
             </a:endParaRPr>
           </a:p>
           <a:p>
-            <a:pPr marL="396875" indent="-396875">
+            <a:pPr marL="571500" indent="-571500">
               <a:buFont typeface="Arial" panose="020B0604020202020204" pitchFamily="34" charset="0"/>
               <a:buChar char="•"/>
             </a:pPr>
@@ -8179,26 +5793,11 @@
               <a:rPr lang="en-US" sz="2800" dirty="0" smtClean="0">
                 <a:ln w="0"/>
               </a:rPr>
-              <a:t>Supports </a:t>
-            </a:r>
-            <a:r>
-              <a:rPr lang="en-US" sz="2800" dirty="0" smtClean="0">
-                <a:ln w="0"/>
-              </a:rPr>
-              <a:t>continuous user </a:t>
-            </a:r>
-            <a:r>
-              <a:rPr lang="en-US" sz="2800" dirty="0" smtClean="0">
-                <a:ln w="0"/>
-              </a:rPr>
-              <a:t>interaction.</a:t>
-            </a:r>
-            <a:endParaRPr lang="en-US" sz="2800" dirty="0">
-              <a:ln w="0"/>
-            </a:endParaRPr>
-          </a:p>
-          <a:p>
-            <a:pPr marL="396875" indent="-396875">
+              <a:t>Supports continuous user interaction.</a:t>
+            </a:r>
+          </a:p>
+          <a:p>
+            <a:pPr marL="571500" indent="-571500">
               <a:buFont typeface="Arial" panose="020B0604020202020204" pitchFamily="34" charset="0"/>
               <a:buChar char="•"/>
             </a:pPr>
@@ -8207,7 +5806,7 @@
             </a:endParaRPr>
           </a:p>
           <a:p>
-            <a:pPr marL="396875" indent="-396875">
+            <a:pPr marL="571500" indent="-571500">
               <a:buFont typeface="Arial" panose="020B0604020202020204" pitchFamily="34" charset="0"/>
               <a:buChar char="•"/>
             </a:pPr>
@@ -8215,32 +5814,20 @@
               <a:rPr lang="en-US" sz="2800" dirty="0" smtClean="0">
                 <a:ln w="0"/>
               </a:rPr>
-              <a:t>Ensures </a:t>
-            </a:r>
-            <a:r>
-              <a:rPr lang="en-US" sz="2800" dirty="0" smtClean="0">
-                <a:ln w="0"/>
-              </a:rPr>
-              <a:t>a smooth user </a:t>
-            </a:r>
-            <a:r>
-              <a:rPr lang="en-US" sz="2800" dirty="0" smtClean="0">
-                <a:ln w="0"/>
-              </a:rPr>
-              <a:t>experience.</a:t>
-            </a:r>
-          </a:p>
-          <a:p>
-            <a:pPr marL="396875" indent="-396875">
-              <a:buFont typeface="Arial" panose="020B0604020202020204" pitchFamily="34" charset="0"/>
-              <a:buChar char="•"/>
-            </a:pPr>
-            <a:endParaRPr lang="en-US" sz="2800" dirty="0">
+              <a:t>Ensures a smooth user experience.</a:t>
+            </a:r>
+          </a:p>
+          <a:p>
+            <a:pPr marL="571500" indent="-571500">
+              <a:buFont typeface="Arial" panose="020B0604020202020204" pitchFamily="34" charset="0"/>
+              <a:buChar char="•"/>
+            </a:pPr>
+            <a:endParaRPr lang="en-US" sz="2800" dirty="0" smtClean="0">
               <a:ln w="0"/>
             </a:endParaRPr>
           </a:p>
           <a:p>
-            <a:pPr marL="396875" indent="-396875">
+            <a:pPr marL="571500" indent="-571500">
               <a:buFont typeface="Arial" panose="020B0604020202020204" pitchFamily="34" charset="0"/>
               <a:buChar char="•"/>
             </a:pPr>
@@ -8248,13 +5835,7 @@
               <a:rPr lang="en-US" sz="2800" dirty="0" smtClean="0">
                 <a:ln w="0"/>
               </a:rPr>
-              <a:t>Provides </a:t>
-            </a:r>
-            <a:r>
-              <a:rPr lang="en-US" sz="2800" dirty="0" smtClean="0">
-                <a:ln w="0"/>
-              </a:rPr>
-              <a:t>feedback for invalid inputs.</a:t>
+              <a:t>Provides feedback for invalid inputs.</a:t>
             </a:r>
           </a:p>
         </p:txBody>
@@ -8281,7 +5862,7 @@
         </p:blipFill>
         <p:spPr>
           <a:xfrm>
-            <a:off x="5876510" y="1691640"/>
+            <a:off x="5876510" y="0"/>
             <a:ext cx="6315490" cy="3536674"/>
           </a:xfrm>
           <a:prstGeom prst="rect">
@@ -8299,370 +5880,12 @@
   <p:clrMapOvr>
     <a:masterClrMapping/>
   </p:clrMapOvr>
-  <mc:AlternateContent xmlns:mc="http://schemas.openxmlformats.org/markup-compatibility/2006">
-    <mc:Choice xmlns:p14="http://schemas.microsoft.com/office/powerpoint/2010/main" Requires="p14">
-      <p:transition p14:dur="0"/>
-    </mc:Choice>
-    <mc:Fallback>
-      <p:transition/>
-    </mc:Fallback>
-  </mc:AlternateContent>
   <p:timing>
     <p:tnLst>
       <p:par>
-        <p:cTn id="1" dur="indefinite" restart="never" nodeType="tmRoot">
-          <p:childTnLst>
-            <p:seq concurrent="1" nextAc="seek">
-              <p:cTn id="2" dur="indefinite" nodeType="mainSeq">
-                <p:childTnLst>
-                  <p:par>
-                    <p:cTn id="3" fill="hold">
-                      <p:stCondLst>
-                        <p:cond delay="indefinite"/>
-                      </p:stCondLst>
-                      <p:childTnLst>
-                        <p:par>
-                          <p:cTn id="4" fill="hold">
-                            <p:stCondLst>
-                              <p:cond delay="0"/>
-                            </p:stCondLst>
-                            <p:childTnLst>
-                              <p:par>
-                                <p:cTn id="5" presetID="53" presetClass="entr" presetSubtype="16" fill="hold" nodeType="clickEffect">
-                                  <p:stCondLst>
-                                    <p:cond delay="0"/>
-                                  </p:stCondLst>
-                                  <p:childTnLst>
-                                    <p:set>
-                                      <p:cBhvr>
-                                        <p:cTn id="6" dur="1" fill="hold">
-                                          <p:stCondLst>
-                                            <p:cond delay="0"/>
-                                          </p:stCondLst>
-                                        </p:cTn>
-                                        <p:tgtEl>
-                                          <p:spTgt spid="6"/>
-                                        </p:tgtEl>
-                                        <p:attrNameLst>
-                                          <p:attrName>style.visibility</p:attrName>
-                                        </p:attrNameLst>
-                                      </p:cBhvr>
-                                      <p:to>
-                                        <p:strVal val="visible"/>
-                                      </p:to>
-                                    </p:set>
-                                    <p:anim calcmode="lin" valueType="num">
-                                      <p:cBhvr>
-                                        <p:cTn id="7" dur="500" fill="hold"/>
-                                        <p:tgtEl>
-                                          <p:spTgt spid="6"/>
-                                        </p:tgtEl>
-                                        <p:attrNameLst>
-                                          <p:attrName>ppt_w</p:attrName>
-                                        </p:attrNameLst>
-                                      </p:cBhvr>
-                                      <p:tavLst>
-                                        <p:tav tm="0">
-                                          <p:val>
-                                            <p:fltVal val="0"/>
-                                          </p:val>
-                                        </p:tav>
-                                        <p:tav tm="100000">
-                                          <p:val>
-                                            <p:strVal val="#ppt_w"/>
-                                          </p:val>
-                                        </p:tav>
-                                      </p:tavLst>
-                                    </p:anim>
-                                    <p:anim calcmode="lin" valueType="num">
-                                      <p:cBhvr>
-                                        <p:cTn id="8" dur="500" fill="hold"/>
-                                        <p:tgtEl>
-                                          <p:spTgt spid="6"/>
-                                        </p:tgtEl>
-                                        <p:attrNameLst>
-                                          <p:attrName>ppt_h</p:attrName>
-                                        </p:attrNameLst>
-                                      </p:cBhvr>
-                                      <p:tavLst>
-                                        <p:tav tm="0">
-                                          <p:val>
-                                            <p:fltVal val="0"/>
-                                          </p:val>
-                                        </p:tav>
-                                        <p:tav tm="100000">
-                                          <p:val>
-                                            <p:strVal val="#ppt_h"/>
-                                          </p:val>
-                                        </p:tav>
-                                      </p:tavLst>
-                                    </p:anim>
-                                    <p:animEffect transition="in" filter="fade">
-                                      <p:cBhvr>
-                                        <p:cTn id="9" dur="500"/>
-                                        <p:tgtEl>
-                                          <p:spTgt spid="6"/>
-                                        </p:tgtEl>
-                                      </p:cBhvr>
-                                    </p:animEffect>
-                                  </p:childTnLst>
-                                </p:cTn>
-                              </p:par>
-                            </p:childTnLst>
-                          </p:cTn>
-                        </p:par>
-                      </p:childTnLst>
-                    </p:cTn>
-                  </p:par>
-                  <p:par>
-                    <p:cTn id="10" fill="hold">
-                      <p:stCondLst>
-                        <p:cond delay="indefinite"/>
-                      </p:stCondLst>
-                      <p:childTnLst>
-                        <p:par>
-                          <p:cTn id="11" fill="hold">
-                            <p:stCondLst>
-                              <p:cond delay="0"/>
-                            </p:stCondLst>
-                            <p:childTnLst>
-                              <p:par>
-                                <p:cTn id="12" presetID="12" presetClass="entr" presetSubtype="4" fill="hold" grpId="0" nodeType="clickEffect">
-                                  <p:stCondLst>
-                                    <p:cond delay="0"/>
-                                  </p:stCondLst>
-                                  <p:childTnLst>
-                                    <p:set>
-                                      <p:cBhvr>
-                                        <p:cTn id="13" dur="1" fill="hold">
-                                          <p:stCondLst>
-                                            <p:cond delay="0"/>
-                                          </p:stCondLst>
-                                        </p:cTn>
-                                        <p:tgtEl>
-                                          <p:spTgt spid="4"/>
-                                        </p:tgtEl>
-                                        <p:attrNameLst>
-                                          <p:attrName>style.visibility</p:attrName>
-                                        </p:attrNameLst>
-                                      </p:cBhvr>
-                                      <p:to>
-                                        <p:strVal val="visible"/>
-                                      </p:to>
-                                    </p:set>
-                                    <p:anim calcmode="lin" valueType="num">
-                                      <p:cBhvr additive="base">
-                                        <p:cTn id="14" dur="500"/>
-                                        <p:tgtEl>
-                                          <p:spTgt spid="4"/>
-                                        </p:tgtEl>
-                                        <p:attrNameLst>
-                                          <p:attrName>ppt_y</p:attrName>
-                                        </p:attrNameLst>
-                                      </p:cBhvr>
-                                      <p:tavLst>
-                                        <p:tav tm="0">
-                                          <p:val>
-                                            <p:strVal val="#ppt_y+#ppt_h*1.125000"/>
-                                          </p:val>
-                                        </p:tav>
-                                        <p:tav tm="100000">
-                                          <p:val>
-                                            <p:strVal val="#ppt_y"/>
-                                          </p:val>
-                                        </p:tav>
-                                      </p:tavLst>
-                                    </p:anim>
-                                    <p:animEffect transition="in" filter="wipe(up)">
-                                      <p:cBhvr>
-                                        <p:cTn id="15" dur="500"/>
-                                        <p:tgtEl>
-                                          <p:spTgt spid="4"/>
-                                        </p:tgtEl>
-                                      </p:cBhvr>
-                                    </p:animEffect>
-                                  </p:childTnLst>
-                                </p:cTn>
-                              </p:par>
-                            </p:childTnLst>
-                          </p:cTn>
-                        </p:par>
-                      </p:childTnLst>
-                    </p:cTn>
-                  </p:par>
-                  <p:par>
-                    <p:cTn id="16" fill="hold">
-                      <p:stCondLst>
-                        <p:cond delay="indefinite"/>
-                      </p:stCondLst>
-                      <p:childTnLst>
-                        <p:par>
-                          <p:cTn id="17" fill="hold">
-                            <p:stCondLst>
-                              <p:cond delay="0"/>
-                            </p:stCondLst>
-                            <p:childTnLst>
-                              <p:par>
-                                <p:cTn id="18" presetID="52" presetClass="exit" presetSubtype="0" fill="hold" nodeType="clickEffect">
-                                  <p:stCondLst>
-                                    <p:cond delay="0"/>
-                                  </p:stCondLst>
-                                  <p:childTnLst>
-                                    <p:animScale>
-                                      <p:cBhvr>
-                                        <p:cTn id="19" dur="1000" accel="50000">
-                                          <p:stCondLst>
-                                            <p:cond delay="0"/>
-                                          </p:stCondLst>
-                                        </p:cTn>
-                                        <p:tgtEl>
-                                          <p:spTgt spid="6"/>
-                                        </p:tgtEl>
-                                      </p:cBhvr>
-                                      <p:from x="100000" y="100000"/>
-                                      <p:to x="250000" y="250000"/>
-                                    </p:animScale>
-                                    <p:animMotion origin="layout" path="M 0.0000 0.0000 C 0.03802 0.0 0.1441 0.02341 0.1826 0.0915 C 0.22118 0.15964 0.24705 0.31256 0.2318 0.4083 C 0.21649 0.50394 0.20747 0.57948 0.0908 0.6661 C -0.02552 0.75279 -0.37517 0.88508 -0.4674 0.9289" pathEditMode="relative" ptsTypes="">
-                                      <p:cBhvr>
-                                        <p:cTn id="20" dur="1000" accel="50000">
-                                          <p:stCondLst>
-                                            <p:cond delay="0"/>
-                                          </p:stCondLst>
-                                        </p:cTn>
-                                        <p:tgtEl>
-                                          <p:spTgt spid="6"/>
-                                        </p:tgtEl>
-                                        <p:attrNameLst>
-                                          <p:attrName>ppt_x</p:attrName>
-                                          <p:attrName>ppt_y</p:attrName>
-                                        </p:attrNameLst>
-                                      </p:cBhvr>
-                                    </p:animMotion>
-                                    <p:animEffect transition="out" filter="fade">
-                                      <p:cBhvr>
-                                        <p:cTn id="21" dur="1000"/>
-                                        <p:tgtEl>
-                                          <p:spTgt spid="6"/>
-                                        </p:tgtEl>
-                                      </p:cBhvr>
-                                    </p:animEffect>
-                                    <p:set>
-                                      <p:cBhvr>
-                                        <p:cTn id="22" dur="1" fill="hold">
-                                          <p:stCondLst>
-                                            <p:cond delay="999"/>
-                                          </p:stCondLst>
-                                        </p:cTn>
-                                        <p:tgtEl>
-                                          <p:spTgt spid="6"/>
-                                        </p:tgtEl>
-                                        <p:attrNameLst>
-                                          <p:attrName>style.visibility</p:attrName>
-                                        </p:attrNameLst>
-                                      </p:cBhvr>
-                                      <p:to>
-                                        <p:strVal val="hidden"/>
-                                      </p:to>
-                                    </p:set>
-                                  </p:childTnLst>
-                                </p:cTn>
-                              </p:par>
-                              <p:par>
-                                <p:cTn id="23" presetID="52" presetClass="exit" presetSubtype="0" fill="hold" grpId="1" nodeType="withEffect">
-                                  <p:stCondLst>
-                                    <p:cond delay="0"/>
-                                  </p:stCondLst>
-                                  <p:childTnLst>
-                                    <p:animScale>
-                                      <p:cBhvr>
-                                        <p:cTn id="24" dur="1000" accel="50000">
-                                          <p:stCondLst>
-                                            <p:cond delay="0"/>
-                                          </p:stCondLst>
-                                        </p:cTn>
-                                        <p:tgtEl>
-                                          <p:spTgt spid="4"/>
-                                        </p:tgtEl>
-                                      </p:cBhvr>
-                                      <p:from x="100000" y="100000"/>
-                                      <p:to x="250000" y="250000"/>
-                                    </p:animScale>
-                                    <p:animMotion origin="layout" path="M 0.0000 0.0000 C 0.03802 0.0 0.1441 0.02341 0.1826 0.0915 C 0.22118 0.15964 0.24705 0.31256 0.2318 0.4083 C 0.21649 0.50394 0.20747 0.57948 0.0908 0.6661 C -0.02552 0.75279 -0.37517 0.88508 -0.4674 0.9289" pathEditMode="relative" ptsTypes="">
-                                      <p:cBhvr>
-                                        <p:cTn id="25" dur="1000" accel="50000">
-                                          <p:stCondLst>
-                                            <p:cond delay="0"/>
-                                          </p:stCondLst>
-                                        </p:cTn>
-                                        <p:tgtEl>
-                                          <p:spTgt spid="4"/>
-                                        </p:tgtEl>
-                                        <p:attrNameLst>
-                                          <p:attrName>ppt_x</p:attrName>
-                                          <p:attrName>ppt_y</p:attrName>
-                                        </p:attrNameLst>
-                                      </p:cBhvr>
-                                    </p:animMotion>
-                                    <p:animEffect transition="out" filter="fade">
-                                      <p:cBhvr>
-                                        <p:cTn id="26" dur="1000"/>
-                                        <p:tgtEl>
-                                          <p:spTgt spid="4"/>
-                                        </p:tgtEl>
-                                      </p:cBhvr>
-                                    </p:animEffect>
-                                    <p:set>
-                                      <p:cBhvr>
-                                        <p:cTn id="27" dur="1" fill="hold">
-                                          <p:stCondLst>
-                                            <p:cond delay="999"/>
-                                          </p:stCondLst>
-                                        </p:cTn>
-                                        <p:tgtEl>
-                                          <p:spTgt spid="4"/>
-                                        </p:tgtEl>
-                                        <p:attrNameLst>
-                                          <p:attrName>style.visibility</p:attrName>
-                                        </p:attrNameLst>
-                                      </p:cBhvr>
-                                      <p:to>
-                                        <p:strVal val="hidden"/>
-                                      </p:to>
-                                    </p:set>
-                                  </p:childTnLst>
-                                </p:cTn>
-                              </p:par>
-                            </p:childTnLst>
-                          </p:cTn>
-                        </p:par>
-                      </p:childTnLst>
-                    </p:cTn>
-                  </p:par>
-                </p:childTnLst>
-              </p:cTn>
-              <p:prevCondLst>
-                <p:cond evt="onPrev" delay="0">
-                  <p:tgtEl>
-                    <p:sldTgt/>
-                  </p:tgtEl>
-                </p:cond>
-              </p:prevCondLst>
-              <p:nextCondLst>
-                <p:cond evt="onNext" delay="0">
-                  <p:tgtEl>
-                    <p:sldTgt/>
-                  </p:tgtEl>
-                </p:cond>
-              </p:nextCondLst>
-            </p:seq>
-          </p:childTnLst>
-        </p:cTn>
+        <p:cTn id="1" dur="indefinite" restart="never" nodeType="tmRoot"/>
       </p:par>
     </p:tnLst>
-    <p:bldLst>
-      <p:bldP spid="4" grpId="0"/>
-      <p:bldP spid="4" grpId="1"/>
-    </p:bldLst>
   </p:timing>
 </p:sld>
 </file>
@@ -8686,6 +5909,34 @@
       </p:grpSpPr>
       <p:sp>
         <p:nvSpPr>
+          <p:cNvPr id="2" name="Footer Placeholder 1"/>
+          <p:cNvSpPr>
+            <a:spLocks noGrp="1"/>
+          </p:cNvSpPr>
+          <p:nvPr>
+            <p:ph type="ftr" sz="quarter" idx="11"/>
+          </p:nvPr>
+        </p:nvSpPr>
+        <p:spPr>
+          <a:xfrm>
+            <a:off x="0" y="6356349"/>
+            <a:ext cx="4114800" cy="365125"/>
+          </a:xfrm>
+        </p:spPr>
+        <p:txBody>
+          <a:bodyPr/>
+          <a:lstStyle/>
+          <a:p>
+            <a:r>
+              <a:rPr lang="en-US" dirty="0" smtClean="0"/>
+              <a:t>16 March, 2025</a:t>
+            </a:r>
+            <a:endParaRPr lang="en-US" dirty="0"/>
+          </a:p>
+        </p:txBody>
+      </p:sp>
+      <p:sp>
+        <p:nvSpPr>
           <p:cNvPr id="3" name="Slide Number Placeholder 2"/>
           <p:cNvSpPr>
             <a:spLocks noGrp="1"/>
@@ -8716,7 +5967,7 @@
         <p:spPr>
           <a:xfrm>
             <a:off x="0" y="0"/>
-            <a:ext cx="12192000" cy="5447645"/>
+            <a:ext cx="12192000" cy="5878532"/>
           </a:xfrm>
           <a:prstGeom prst="rect">
             <a:avLst/>
@@ -8842,14 +6093,14 @@
               <a:rPr lang="en-US" sz="2800" dirty="0" smtClean="0">
                 <a:ln w="0"/>
               </a:rPr>
-              <a:t>Provide real-time student organization</a:t>
-            </a:r>
-            <a:r>
-              <a:rPr lang="en-US" sz="2800" dirty="0" smtClean="0">
-                <a:ln w="0"/>
-              </a:rPr>
-              <a:t>.</a:t>
-            </a:r>
+              <a:t>Provide real-time student organization.</a:t>
+            </a:r>
+          </a:p>
+          <a:p>
+            <a:pPr marL="571500" indent="-571500">
+              <a:buFont typeface="Arial" panose="020B0604020202020204" pitchFamily="34" charset="0"/>
+              <a:buChar char="•"/>
+            </a:pPr>
             <a:endParaRPr lang="en-US" sz="2800" dirty="0">
               <a:ln w="0"/>
             </a:endParaRPr>
@@ -8859,9 +6110,12 @@
               <a:buFont typeface="Arial" panose="020B0604020202020204" pitchFamily="34" charset="0"/>
               <a:buChar char="•"/>
             </a:pPr>
-            <a:endParaRPr lang="en-US" sz="2800" dirty="0" smtClean="0">
-              <a:ln w="0"/>
-            </a:endParaRPr>
+            <a:r>
+              <a:rPr lang="en-US" sz="2800" dirty="0" smtClean="0">
+                <a:ln w="0"/>
+              </a:rPr>
+              <a:t>Prevent duplicate student entries.</a:t>
+            </a:r>
           </a:p>
         </p:txBody>
       </p:sp>
@@ -8887,7 +6141,7 @@
         </p:blipFill>
         <p:spPr>
           <a:xfrm>
-            <a:off x="6901069" y="1600863"/>
+            <a:off x="6463748" y="655983"/>
             <a:ext cx="4452731" cy="3339548"/>
           </a:xfrm>
           <a:prstGeom prst="rect">
@@ -8905,420 +6159,12 @@
   <p:clrMapOvr>
     <a:masterClrMapping/>
   </p:clrMapOvr>
-  <mc:AlternateContent xmlns:mc="http://schemas.openxmlformats.org/markup-compatibility/2006">
-    <mc:Choice xmlns:p14="http://schemas.microsoft.com/office/powerpoint/2010/main" Requires="p14">
-      <p:transition p14:dur="0"/>
-    </mc:Choice>
-    <mc:Fallback>
-      <p:transition/>
-    </mc:Fallback>
-  </mc:AlternateContent>
   <p:timing>
     <p:tnLst>
       <p:par>
-        <p:cTn id="1" dur="indefinite" restart="never" nodeType="tmRoot">
-          <p:childTnLst>
-            <p:seq concurrent="1" nextAc="seek">
-              <p:cTn id="2" dur="indefinite" nodeType="mainSeq">
-                <p:childTnLst>
-                  <p:par>
-                    <p:cTn id="3" fill="hold">
-                      <p:stCondLst>
-                        <p:cond delay="indefinite"/>
-                      </p:stCondLst>
-                      <p:childTnLst>
-                        <p:par>
-                          <p:cTn id="4" fill="hold">
-                            <p:stCondLst>
-                              <p:cond delay="0"/>
-                            </p:stCondLst>
-                            <p:childTnLst>
-                              <p:par>
-                                <p:cTn id="5" presetID="53" presetClass="entr" presetSubtype="16" fill="hold" nodeType="clickEffect">
-                                  <p:stCondLst>
-                                    <p:cond delay="0"/>
-                                  </p:stCondLst>
-                                  <p:childTnLst>
-                                    <p:set>
-                                      <p:cBhvr>
-                                        <p:cTn id="6" dur="1" fill="hold">
-                                          <p:stCondLst>
-                                            <p:cond delay="0"/>
-                                          </p:stCondLst>
-                                        </p:cTn>
-                                        <p:tgtEl>
-                                          <p:spTgt spid="6"/>
-                                        </p:tgtEl>
-                                        <p:attrNameLst>
-                                          <p:attrName>style.visibility</p:attrName>
-                                        </p:attrNameLst>
-                                      </p:cBhvr>
-                                      <p:to>
-                                        <p:strVal val="visible"/>
-                                      </p:to>
-                                    </p:set>
-                                    <p:anim calcmode="lin" valueType="num">
-                                      <p:cBhvr>
-                                        <p:cTn id="7" dur="500" fill="hold"/>
-                                        <p:tgtEl>
-                                          <p:spTgt spid="6"/>
-                                        </p:tgtEl>
-                                        <p:attrNameLst>
-                                          <p:attrName>ppt_w</p:attrName>
-                                        </p:attrNameLst>
-                                      </p:cBhvr>
-                                      <p:tavLst>
-                                        <p:tav tm="0">
-                                          <p:val>
-                                            <p:fltVal val="0"/>
-                                          </p:val>
-                                        </p:tav>
-                                        <p:tav tm="100000">
-                                          <p:val>
-                                            <p:strVal val="#ppt_w"/>
-                                          </p:val>
-                                        </p:tav>
-                                      </p:tavLst>
-                                    </p:anim>
-                                    <p:anim calcmode="lin" valueType="num">
-                                      <p:cBhvr>
-                                        <p:cTn id="8" dur="500" fill="hold"/>
-                                        <p:tgtEl>
-                                          <p:spTgt spid="6"/>
-                                        </p:tgtEl>
-                                        <p:attrNameLst>
-                                          <p:attrName>ppt_h</p:attrName>
-                                        </p:attrNameLst>
-                                      </p:cBhvr>
-                                      <p:tavLst>
-                                        <p:tav tm="0">
-                                          <p:val>
-                                            <p:fltVal val="0"/>
-                                          </p:val>
-                                        </p:tav>
-                                        <p:tav tm="100000">
-                                          <p:val>
-                                            <p:strVal val="#ppt_h"/>
-                                          </p:val>
-                                        </p:tav>
-                                      </p:tavLst>
-                                    </p:anim>
-                                    <p:animEffect transition="in" filter="fade">
-                                      <p:cBhvr>
-                                        <p:cTn id="9" dur="500"/>
-                                        <p:tgtEl>
-                                          <p:spTgt spid="6"/>
-                                        </p:tgtEl>
-                                      </p:cBhvr>
-                                    </p:animEffect>
-                                  </p:childTnLst>
-                                </p:cTn>
-                              </p:par>
-                            </p:childTnLst>
-                          </p:cTn>
-                        </p:par>
-                      </p:childTnLst>
-                    </p:cTn>
-                  </p:par>
-                  <p:par>
-                    <p:cTn id="10" fill="hold">
-                      <p:stCondLst>
-                        <p:cond delay="indefinite"/>
-                      </p:stCondLst>
-                      <p:childTnLst>
-                        <p:par>
-                          <p:cTn id="11" fill="hold">
-                            <p:stCondLst>
-                              <p:cond delay="0"/>
-                            </p:stCondLst>
-                            <p:childTnLst>
-                              <p:par>
-                                <p:cTn id="12" presetID="37" presetClass="entr" presetSubtype="0" fill="hold" grpId="0" nodeType="clickEffect">
-                                  <p:stCondLst>
-                                    <p:cond delay="0"/>
-                                  </p:stCondLst>
-                                  <p:childTnLst>
-                                    <p:set>
-                                      <p:cBhvr>
-                                        <p:cTn id="13" dur="1" fill="hold">
-                                          <p:stCondLst>
-                                            <p:cond delay="0"/>
-                                          </p:stCondLst>
-                                        </p:cTn>
-                                        <p:tgtEl>
-                                          <p:spTgt spid="4"/>
-                                        </p:tgtEl>
-                                        <p:attrNameLst>
-                                          <p:attrName>style.visibility</p:attrName>
-                                        </p:attrNameLst>
-                                      </p:cBhvr>
-                                      <p:to>
-                                        <p:strVal val="visible"/>
-                                      </p:to>
-                                    </p:set>
-                                    <p:animEffect transition="in" filter="fade">
-                                      <p:cBhvr>
-                                        <p:cTn id="14" dur="1000"/>
-                                        <p:tgtEl>
-                                          <p:spTgt spid="4"/>
-                                        </p:tgtEl>
-                                      </p:cBhvr>
-                                    </p:animEffect>
-                                    <p:anim calcmode="lin" valueType="num">
-                                      <p:cBhvr>
-                                        <p:cTn id="15" dur="1000" fill="hold"/>
-                                        <p:tgtEl>
-                                          <p:spTgt spid="4"/>
-                                        </p:tgtEl>
-                                        <p:attrNameLst>
-                                          <p:attrName>ppt_x</p:attrName>
-                                        </p:attrNameLst>
-                                      </p:cBhvr>
-                                      <p:tavLst>
-                                        <p:tav tm="0">
-                                          <p:val>
-                                            <p:strVal val="#ppt_x"/>
-                                          </p:val>
-                                        </p:tav>
-                                        <p:tav tm="100000">
-                                          <p:val>
-                                            <p:strVal val="#ppt_x"/>
-                                          </p:val>
-                                        </p:tav>
-                                      </p:tavLst>
-                                    </p:anim>
-                                    <p:anim calcmode="lin" valueType="num">
-                                      <p:cBhvr>
-                                        <p:cTn id="16" dur="900" decel="100000" fill="hold"/>
-                                        <p:tgtEl>
-                                          <p:spTgt spid="4"/>
-                                        </p:tgtEl>
-                                        <p:attrNameLst>
-                                          <p:attrName>ppt_y</p:attrName>
-                                        </p:attrNameLst>
-                                      </p:cBhvr>
-                                      <p:tavLst>
-                                        <p:tav tm="0">
-                                          <p:val>
-                                            <p:strVal val="#ppt_y+1"/>
-                                          </p:val>
-                                        </p:tav>
-                                        <p:tav tm="100000">
-                                          <p:val>
-                                            <p:strVal val="#ppt_y-.03"/>
-                                          </p:val>
-                                        </p:tav>
-                                      </p:tavLst>
-                                    </p:anim>
-                                    <p:anim calcmode="lin" valueType="num">
-                                      <p:cBhvr>
-                                        <p:cTn id="17" dur="100" accel="100000" fill="hold">
-                                          <p:stCondLst>
-                                            <p:cond delay="900"/>
-                                          </p:stCondLst>
-                                        </p:cTn>
-                                        <p:tgtEl>
-                                          <p:spTgt spid="4"/>
-                                        </p:tgtEl>
-                                        <p:attrNameLst>
-                                          <p:attrName>ppt_y</p:attrName>
-                                        </p:attrNameLst>
-                                      </p:cBhvr>
-                                      <p:tavLst>
-                                        <p:tav tm="0">
-                                          <p:val>
-                                            <p:strVal val="#ppt_y-.03"/>
-                                          </p:val>
-                                        </p:tav>
-                                        <p:tav tm="100000">
-                                          <p:val>
-                                            <p:strVal val="#ppt_y"/>
-                                          </p:val>
-                                        </p:tav>
-                                      </p:tavLst>
-                                    </p:anim>
-                                  </p:childTnLst>
-                                </p:cTn>
-                              </p:par>
-                            </p:childTnLst>
-                          </p:cTn>
-                        </p:par>
-                      </p:childTnLst>
-                    </p:cTn>
-                  </p:par>
-                  <p:par>
-                    <p:cTn id="18" fill="hold">
-                      <p:stCondLst>
-                        <p:cond delay="indefinite"/>
-                      </p:stCondLst>
-                      <p:childTnLst>
-                        <p:par>
-                          <p:cTn id="19" fill="hold">
-                            <p:stCondLst>
-                              <p:cond delay="0"/>
-                            </p:stCondLst>
-                            <p:childTnLst>
-                              <p:par>
-                                <p:cTn id="20" presetID="52" presetClass="exit" presetSubtype="0" fill="hold" nodeType="clickEffect">
-                                  <p:stCondLst>
-                                    <p:cond delay="0"/>
-                                  </p:stCondLst>
-                                  <p:childTnLst>
-                                    <p:animScale>
-                                      <p:cBhvr>
-                                        <p:cTn id="21" dur="1000" accel="50000">
-                                          <p:stCondLst>
-                                            <p:cond delay="0"/>
-                                          </p:stCondLst>
-                                        </p:cTn>
-                                        <p:tgtEl>
-                                          <p:spTgt spid="6"/>
-                                        </p:tgtEl>
-                                      </p:cBhvr>
-                                      <p:from x="100000" y="100000"/>
-                                      <p:to x="250000" y="250000"/>
-                                    </p:animScale>
-                                    <p:animMotion origin="layout" path="M 0.0000 0.0000 C 0.03802 0.0 0.1441 0.02341 0.1826 0.0915 C 0.22118 0.15964 0.24705 0.31256 0.2318 0.4083 C 0.21649 0.50394 0.20747 0.57948 0.0908 0.6661 C -0.02552 0.75279 -0.37517 0.88508 -0.4674 0.9289" pathEditMode="relative" ptsTypes="">
-                                      <p:cBhvr>
-                                        <p:cTn id="22" dur="1000" accel="50000">
-                                          <p:stCondLst>
-                                            <p:cond delay="0"/>
-                                          </p:stCondLst>
-                                        </p:cTn>
-                                        <p:tgtEl>
-                                          <p:spTgt spid="6"/>
-                                        </p:tgtEl>
-                                        <p:attrNameLst>
-                                          <p:attrName>ppt_x</p:attrName>
-                                          <p:attrName>ppt_y</p:attrName>
-                                        </p:attrNameLst>
-                                      </p:cBhvr>
-                                    </p:animMotion>
-                                    <p:animEffect transition="out" filter="fade">
-                                      <p:cBhvr>
-                                        <p:cTn id="23" dur="1000"/>
-                                        <p:tgtEl>
-                                          <p:spTgt spid="6"/>
-                                        </p:tgtEl>
-                                      </p:cBhvr>
-                                    </p:animEffect>
-                                    <p:set>
-                                      <p:cBhvr>
-                                        <p:cTn id="24" dur="1" fill="hold">
-                                          <p:stCondLst>
-                                            <p:cond delay="999"/>
-                                          </p:stCondLst>
-                                        </p:cTn>
-                                        <p:tgtEl>
-                                          <p:spTgt spid="6"/>
-                                        </p:tgtEl>
-                                        <p:attrNameLst>
-                                          <p:attrName>style.visibility</p:attrName>
-                                        </p:attrNameLst>
-                                      </p:cBhvr>
-                                      <p:to>
-                                        <p:strVal val="hidden"/>
-                                      </p:to>
-                                    </p:set>
-                                  </p:childTnLst>
-                                </p:cTn>
-                              </p:par>
-                              <p:par>
-                                <p:cTn id="25" presetID="52" presetClass="exit" presetSubtype="0" fill="hold" grpId="1" nodeType="withEffect">
-                                  <p:stCondLst>
-                                    <p:cond delay="0"/>
-                                  </p:stCondLst>
-                                  <p:childTnLst>
-                                    <p:animScale>
-                                      <p:cBhvr>
-                                        <p:cTn id="26" dur="1000" accel="50000">
-                                          <p:stCondLst>
-                                            <p:cond delay="0"/>
-                                          </p:stCondLst>
-                                        </p:cTn>
-                                        <p:tgtEl>
-                                          <p:spTgt spid="4"/>
-                                        </p:tgtEl>
-                                      </p:cBhvr>
-                                      <p:from x="100000" y="100000"/>
-                                      <p:to x="250000" y="250000"/>
-                                    </p:animScale>
-                                    <p:animMotion origin="layout" path="M 0.0000 0.0000 C 0.03802 0.0 0.1441 0.02341 0.1826 0.0915 C 0.22118 0.15964 0.24705 0.31256 0.2318 0.4083 C 0.21649 0.50394 0.20747 0.57948 0.0908 0.6661 C -0.02552 0.75279 -0.37517 0.88508 -0.4674 0.9289" pathEditMode="relative" ptsTypes="">
-                                      <p:cBhvr>
-                                        <p:cTn id="27" dur="1000" accel="50000">
-                                          <p:stCondLst>
-                                            <p:cond delay="0"/>
-                                          </p:stCondLst>
-                                        </p:cTn>
-                                        <p:tgtEl>
-                                          <p:spTgt spid="4"/>
-                                        </p:tgtEl>
-                                        <p:attrNameLst>
-                                          <p:attrName>ppt_x</p:attrName>
-                                          <p:attrName>ppt_y</p:attrName>
-                                        </p:attrNameLst>
-                                      </p:cBhvr>
-                                    </p:animMotion>
-                                    <p:animEffect transition="out" filter="fade">
-                                      <p:cBhvr>
-                                        <p:cTn id="28" dur="1000"/>
-                                        <p:tgtEl>
-                                          <p:spTgt spid="4"/>
-                                        </p:tgtEl>
-                                      </p:cBhvr>
-                                    </p:animEffect>
-                                    <p:set>
-                                      <p:cBhvr>
-                                        <p:cTn id="29" dur="1" fill="hold">
-                                          <p:stCondLst>
-                                            <p:cond delay="999"/>
-                                          </p:stCondLst>
-                                        </p:cTn>
-                                        <p:tgtEl>
-                                          <p:spTgt spid="4"/>
-                                        </p:tgtEl>
-                                        <p:attrNameLst>
-                                          <p:attrName>style.visibility</p:attrName>
-                                        </p:attrNameLst>
-                                      </p:cBhvr>
-                                      <p:to>
-                                        <p:strVal val="hidden"/>
-                                      </p:to>
-                                    </p:set>
-                                  </p:childTnLst>
-                                </p:cTn>
-                              </p:par>
-                            </p:childTnLst>
-                          </p:cTn>
-                        </p:par>
-                      </p:childTnLst>
-                    </p:cTn>
-                  </p:par>
-                </p:childTnLst>
-              </p:cTn>
-              <p:prevCondLst>
-                <p:cond evt="onPrev" delay="0">
-                  <p:tgtEl>
-                    <p:sldTgt/>
-                  </p:tgtEl>
-                </p:cond>
-              </p:prevCondLst>
-              <p:nextCondLst>
-                <p:cond evt="onNext" delay="0">
-                  <p:tgtEl>
-                    <p:sldTgt/>
-                  </p:tgtEl>
-                </p:cond>
-              </p:nextCondLst>
-            </p:seq>
-          </p:childTnLst>
-        </p:cTn>
+        <p:cTn id="1" dur="indefinite" restart="never" nodeType="tmRoot"/>
       </p:par>
     </p:tnLst>
-    <p:bldLst>
-      <p:bldP spid="4" grpId="0"/>
-      <p:bldP spid="4" grpId="1"/>
-    </p:bldLst>
   </p:timing>
 </p:sld>
 </file>
@@ -9340,6 +6186,34 @@
           <a:chExt cx="0" cy="0"/>
         </a:xfrm>
       </p:grpSpPr>
+      <p:sp>
+        <p:nvSpPr>
+          <p:cNvPr id="2" name="Footer Placeholder 1"/>
+          <p:cNvSpPr>
+            <a:spLocks noGrp="1"/>
+          </p:cNvSpPr>
+          <p:nvPr>
+            <p:ph type="ftr" sz="quarter" idx="11"/>
+          </p:nvPr>
+        </p:nvSpPr>
+        <p:spPr>
+          <a:xfrm>
+            <a:off x="0" y="6338026"/>
+            <a:ext cx="4114800" cy="365125"/>
+          </a:xfrm>
+        </p:spPr>
+        <p:txBody>
+          <a:bodyPr/>
+          <a:lstStyle/>
+          <a:p>
+            <a:r>
+              <a:rPr lang="en-US" dirty="0" smtClean="0"/>
+              <a:t>16 March, 2025</a:t>
+            </a:r>
+            <a:endParaRPr lang="en-US" dirty="0"/>
+          </a:p>
+        </p:txBody>
+      </p:sp>
       <p:sp>
         <p:nvSpPr>
           <p:cNvPr id="3" name="Slide Number Placeholder 2"/>
@@ -9564,347 +6438,12 @@
   <p:clrMapOvr>
     <a:masterClrMapping/>
   </p:clrMapOvr>
-  <mc:AlternateContent xmlns:mc="http://schemas.openxmlformats.org/markup-compatibility/2006">
-    <mc:Choice xmlns:p14="http://schemas.microsoft.com/office/powerpoint/2010/main" Requires="p14">
-      <p:transition p14:dur="0"/>
-    </mc:Choice>
-    <mc:Fallback>
-      <p:transition/>
-    </mc:Fallback>
-  </mc:AlternateContent>
   <p:timing>
     <p:tnLst>
       <p:par>
-        <p:cTn id="1" dur="indefinite" restart="never" nodeType="tmRoot">
-          <p:childTnLst>
-            <p:seq concurrent="1" nextAc="seek">
-              <p:cTn id="2" dur="indefinite" nodeType="mainSeq">
-                <p:childTnLst>
-                  <p:par>
-                    <p:cTn id="3" fill="hold">
-                      <p:stCondLst>
-                        <p:cond delay="indefinite"/>
-                      </p:stCondLst>
-                      <p:childTnLst>
-                        <p:par>
-                          <p:cTn id="4" fill="hold">
-                            <p:stCondLst>
-                              <p:cond delay="0"/>
-                            </p:stCondLst>
-                            <p:childTnLst>
-                              <p:par>
-                                <p:cTn id="5" presetID="52" presetClass="entr" presetSubtype="0" fill="hold" nodeType="clickEffect">
-                                  <p:stCondLst>
-                                    <p:cond delay="0"/>
-                                  </p:stCondLst>
-                                  <p:childTnLst>
-                                    <p:set>
-                                      <p:cBhvr>
-                                        <p:cTn id="6" dur="1" fill="hold">
-                                          <p:stCondLst>
-                                            <p:cond delay="0"/>
-                                          </p:stCondLst>
-                                        </p:cTn>
-                                        <p:tgtEl>
-                                          <p:spTgt spid="6"/>
-                                        </p:tgtEl>
-                                        <p:attrNameLst>
-                                          <p:attrName>style.visibility</p:attrName>
-                                        </p:attrNameLst>
-                                      </p:cBhvr>
-                                      <p:to>
-                                        <p:strVal val="visible"/>
-                                      </p:to>
-                                    </p:set>
-                                    <p:animScale>
-                                      <p:cBhvr>
-                                        <p:cTn id="7" dur="1000" decel="50000" fill="hold">
-                                          <p:stCondLst>
-                                            <p:cond delay="0"/>
-                                          </p:stCondLst>
-                                        </p:cTn>
-                                        <p:tgtEl>
-                                          <p:spTgt spid="6"/>
-                                        </p:tgtEl>
-                                      </p:cBhvr>
-                                      <p:from x="250000" y="250000"/>
-                                      <p:to x="100000" y="100000"/>
-                                    </p:animScale>
-                                    <p:animMotion origin="layout" path="M -0.46736 0.92887  C -0.37517 0.88508  -0.02552 0.75279  0.0908 0.66613  C  0.20747 0.57948  0.21649 0.50394  0.23177 0.40825  C 0.24705 0.31256  0.22118 0.15964   0.18264 0.09152  C 0.1441 0.02341  0.03802 0.0  0.0 0.0  " pathEditMode="relative" ptsTypes="">
-                                      <p:cBhvr>
-                                        <p:cTn id="8" dur="1000" decel="50000" fill="hold">
-                                          <p:stCondLst>
-                                            <p:cond delay="0"/>
-                                          </p:stCondLst>
-                                        </p:cTn>
-                                        <p:tgtEl>
-                                          <p:spTgt spid="6"/>
-                                        </p:tgtEl>
-                                        <p:attrNameLst>
-                                          <p:attrName>ppt_x</p:attrName>
-                                          <p:attrName>ppt_y</p:attrName>
-                                        </p:attrNameLst>
-                                      </p:cBhvr>
-                                    </p:animMotion>
-                                    <p:animEffect transition="in" filter="fade">
-                                      <p:cBhvr>
-                                        <p:cTn id="9" dur="1000"/>
-                                        <p:tgtEl>
-                                          <p:spTgt spid="6"/>
-                                        </p:tgtEl>
-                                      </p:cBhvr>
-                                    </p:animEffect>
-                                  </p:childTnLst>
-                                </p:cTn>
-                              </p:par>
-                            </p:childTnLst>
-                          </p:cTn>
-                        </p:par>
-                      </p:childTnLst>
-                    </p:cTn>
-                  </p:par>
-                  <p:par>
-                    <p:cTn id="10" fill="hold">
-                      <p:stCondLst>
-                        <p:cond delay="indefinite"/>
-                      </p:stCondLst>
-                      <p:childTnLst>
-                        <p:par>
-                          <p:cTn id="11" fill="hold">
-                            <p:stCondLst>
-                              <p:cond delay="0"/>
-                            </p:stCondLst>
-                            <p:childTnLst>
-                              <p:par>
-                                <p:cTn id="12" presetID="52" presetClass="entr" presetSubtype="0" fill="hold" grpId="0" nodeType="clickEffect">
-                                  <p:stCondLst>
-                                    <p:cond delay="0"/>
-                                  </p:stCondLst>
-                                  <p:childTnLst>
-                                    <p:set>
-                                      <p:cBhvr>
-                                        <p:cTn id="13" dur="1" fill="hold">
-                                          <p:stCondLst>
-                                            <p:cond delay="0"/>
-                                          </p:stCondLst>
-                                        </p:cTn>
-                                        <p:tgtEl>
-                                          <p:spTgt spid="5"/>
-                                        </p:tgtEl>
-                                        <p:attrNameLst>
-                                          <p:attrName>style.visibility</p:attrName>
-                                        </p:attrNameLst>
-                                      </p:cBhvr>
-                                      <p:to>
-                                        <p:strVal val="visible"/>
-                                      </p:to>
-                                    </p:set>
-                                    <p:animScale>
-                                      <p:cBhvr>
-                                        <p:cTn id="14" dur="1000" decel="50000" fill="hold">
-                                          <p:stCondLst>
-                                            <p:cond delay="0"/>
-                                          </p:stCondLst>
-                                        </p:cTn>
-                                        <p:tgtEl>
-                                          <p:spTgt spid="5"/>
-                                        </p:tgtEl>
-                                      </p:cBhvr>
-                                      <p:from x="250000" y="250000"/>
-                                      <p:to x="100000" y="100000"/>
-                                    </p:animScale>
-                                    <p:animMotion origin="layout" path="M -0.46736 0.92887  C -0.37517 0.88508  -0.02552 0.75279  0.0908 0.66613  C  0.20747 0.57948  0.21649 0.50394  0.23177 0.40825  C 0.24705 0.31256  0.22118 0.15964   0.18264 0.09152  C 0.1441 0.02341  0.03802 0.0  0.0 0.0  " pathEditMode="relative" ptsTypes="">
-                                      <p:cBhvr>
-                                        <p:cTn id="15" dur="1000" decel="50000" fill="hold">
-                                          <p:stCondLst>
-                                            <p:cond delay="0"/>
-                                          </p:stCondLst>
-                                        </p:cTn>
-                                        <p:tgtEl>
-                                          <p:spTgt spid="5"/>
-                                        </p:tgtEl>
-                                        <p:attrNameLst>
-                                          <p:attrName>ppt_x</p:attrName>
-                                          <p:attrName>ppt_y</p:attrName>
-                                        </p:attrNameLst>
-                                      </p:cBhvr>
-                                    </p:animMotion>
-                                    <p:animEffect transition="in" filter="fade">
-                                      <p:cBhvr>
-                                        <p:cTn id="16" dur="1000"/>
-                                        <p:tgtEl>
-                                          <p:spTgt spid="5"/>
-                                        </p:tgtEl>
-                                      </p:cBhvr>
-                                    </p:animEffect>
-                                  </p:childTnLst>
-                                </p:cTn>
-                              </p:par>
-                            </p:childTnLst>
-                          </p:cTn>
-                        </p:par>
-                      </p:childTnLst>
-                    </p:cTn>
-                  </p:par>
-                  <p:par>
-                    <p:cTn id="17" fill="hold">
-                      <p:stCondLst>
-                        <p:cond delay="indefinite"/>
-                      </p:stCondLst>
-                      <p:childTnLst>
-                        <p:par>
-                          <p:cTn id="18" fill="hold">
-                            <p:stCondLst>
-                              <p:cond delay="0"/>
-                            </p:stCondLst>
-                            <p:childTnLst>
-                              <p:par>
-                                <p:cTn id="19" presetID="12" presetClass="exit" presetSubtype="4" fill="hold" nodeType="clickEffect">
-                                  <p:stCondLst>
-                                    <p:cond delay="0"/>
-                                  </p:stCondLst>
-                                  <p:childTnLst>
-                                    <p:anim calcmode="lin" valueType="num">
-                                      <p:cBhvr additive="base">
-                                        <p:cTn id="20" dur="500"/>
-                                        <p:tgtEl>
-                                          <p:spTgt spid="6"/>
-                                        </p:tgtEl>
-                                        <p:attrNameLst>
-                                          <p:attrName>ppt_y</p:attrName>
-                                        </p:attrNameLst>
-                                      </p:cBhvr>
-                                      <p:tavLst>
-                                        <p:tav tm="0">
-                                          <p:val>
-                                            <p:strVal val="#ppt_y"/>
-                                          </p:val>
-                                        </p:tav>
-                                        <p:tav tm="100000">
-                                          <p:val>
-                                            <p:strVal val="#ppt_y+#ppt_h*1.125000"/>
-                                          </p:val>
-                                        </p:tav>
-                                      </p:tavLst>
-                                    </p:anim>
-                                    <p:animEffect transition="out" filter="wipe(down)">
-                                      <p:cBhvr>
-                                        <p:cTn id="21" dur="500"/>
-                                        <p:tgtEl>
-                                          <p:spTgt spid="6"/>
-                                        </p:tgtEl>
-                                      </p:cBhvr>
-                                    </p:animEffect>
-                                    <p:set>
-                                      <p:cBhvr>
-                                        <p:cTn id="22" dur="1" fill="hold">
-                                          <p:stCondLst>
-                                            <p:cond delay="499"/>
-                                          </p:stCondLst>
-                                        </p:cTn>
-                                        <p:tgtEl>
-                                          <p:spTgt spid="6"/>
-                                        </p:tgtEl>
-                                        <p:attrNameLst>
-                                          <p:attrName>style.visibility</p:attrName>
-                                        </p:attrNameLst>
-                                      </p:cBhvr>
-                                      <p:to>
-                                        <p:strVal val="hidden"/>
-                                      </p:to>
-                                    </p:set>
-                                  </p:childTnLst>
-                                </p:cTn>
-                              </p:par>
-                              <p:par>
-                                <p:cTn id="23" presetID="12" presetClass="exit" presetSubtype="4" fill="hold" grpId="1" nodeType="withEffect">
-                                  <p:stCondLst>
-                                    <p:cond delay="0"/>
-                                  </p:stCondLst>
-                                  <p:childTnLst>
-                                    <p:anim calcmode="lin" valueType="num">
-                                      <p:cBhvr additive="base">
-                                        <p:cTn id="24" dur="500"/>
-                                        <p:tgtEl>
-                                          <p:spTgt spid="5"/>
-                                        </p:tgtEl>
-                                        <p:attrNameLst>
-                                          <p:attrName>ppt_y</p:attrName>
-                                        </p:attrNameLst>
-                                      </p:cBhvr>
-                                      <p:tavLst>
-                                        <p:tav tm="0">
-                                          <p:val>
-                                            <p:strVal val="#ppt_y"/>
-                                          </p:val>
-                                        </p:tav>
-                                        <p:tav tm="100000">
-                                          <p:val>
-                                            <p:strVal val="#ppt_y+#ppt_h*1.125000"/>
-                                          </p:val>
-                                        </p:tav>
-                                      </p:tavLst>
-                                    </p:anim>
-                                    <p:animEffect transition="out" filter="wipe(down)">
-                                      <p:cBhvr>
-                                        <p:cTn id="25" dur="500"/>
-                                        <p:tgtEl>
-                                          <p:spTgt spid="5"/>
-                                        </p:tgtEl>
-                                      </p:cBhvr>
-                                    </p:animEffect>
-                                    <p:set>
-                                      <p:cBhvr>
-                                        <p:cTn id="26" dur="1" fill="hold">
-                                          <p:stCondLst>
-                                            <p:cond delay="499"/>
-                                          </p:stCondLst>
-                                        </p:cTn>
-                                        <p:tgtEl>
-                                          <p:spTgt spid="5"/>
-                                        </p:tgtEl>
-                                        <p:attrNameLst>
-                                          <p:attrName>style.visibility</p:attrName>
-                                        </p:attrNameLst>
-                                      </p:cBhvr>
-                                      <p:to>
-                                        <p:strVal val="hidden"/>
-                                      </p:to>
-                                    </p:set>
-                                  </p:childTnLst>
-                                </p:cTn>
-                              </p:par>
-                            </p:childTnLst>
-                          </p:cTn>
-                        </p:par>
-                      </p:childTnLst>
-                    </p:cTn>
-                  </p:par>
-                </p:childTnLst>
-              </p:cTn>
-              <p:prevCondLst>
-                <p:cond evt="onPrev" delay="0">
-                  <p:tgtEl>
-                    <p:sldTgt/>
-                  </p:tgtEl>
-                </p:cond>
-              </p:prevCondLst>
-              <p:nextCondLst>
-                <p:cond evt="onNext" delay="0">
-                  <p:tgtEl>
-                    <p:sldTgt/>
-                  </p:tgtEl>
-                </p:cond>
-              </p:nextCondLst>
-            </p:seq>
-          </p:childTnLst>
-        </p:cTn>
+        <p:cTn id="1" dur="indefinite" restart="never" nodeType="tmRoot"/>
       </p:par>
     </p:tnLst>
-    <p:bldLst>
-      <p:bldP spid="5" grpId="0"/>
-      <p:bldP spid="5" grpId="1"/>
-    </p:bldLst>
   </p:timing>
 </p:sld>
 </file>

</xml_diff>